<commit_message>
menti question numbers added
</commit_message>
<xml_diff>
--- a/Slides/FHDS_Data_Collection_Part1.pptx
+++ b/Slides/FHDS_Data_Collection_Part1.pptx
@@ -574,7 +574,7 @@
           <a:p>
             <a:fld id="{B7268E1E-0E44-426D-905E-8AD9B19D2182}" type="datetimeFigureOut">
               <a:rPr lang="cs-CZ" smtClean="0"/>
-              <a:t>30.05.2024</a:t>
+              <a:t>03.06.2024</a:t>
             </a:fld>
             <a:endParaRPr lang="cs-CZ"/>
           </a:p>
@@ -4092,7 +4092,7 @@
             <a:fld id="{1D8BD707-D9CF-40AE-B4C6-C98DA3205C09}" type="datetimeFigureOut">
               <a:rPr lang="en-US" smtClean="0"/>
               <a:pPr/>
-              <a:t>5/30/24</a:t>
+              <a:t>6/3/24</a:t>
             </a:fld>
             <a:endParaRPr lang="en-US"/>
           </a:p>
@@ -4257,7 +4257,7 @@
             <a:fld id="{1D8BD707-D9CF-40AE-B4C6-C98DA3205C09}" type="datetimeFigureOut">
               <a:rPr lang="en-US" smtClean="0"/>
               <a:pPr/>
-              <a:t>5/30/24</a:t>
+              <a:t>6/3/24</a:t>
             </a:fld>
             <a:endParaRPr lang="en-US"/>
           </a:p>
@@ -4432,7 +4432,7 @@
             <a:fld id="{1D8BD707-D9CF-40AE-B4C6-C98DA3205C09}" type="datetimeFigureOut">
               <a:rPr lang="en-US" smtClean="0"/>
               <a:pPr/>
-              <a:t>5/30/24</a:t>
+              <a:t>6/3/24</a:t>
             </a:fld>
             <a:endParaRPr lang="en-US"/>
           </a:p>
@@ -4597,7 +4597,7 @@
             <a:fld id="{1D8BD707-D9CF-40AE-B4C6-C98DA3205C09}" type="datetimeFigureOut">
               <a:rPr lang="en-US" smtClean="0"/>
               <a:pPr/>
-              <a:t>5/30/24</a:t>
+              <a:t>6/3/24</a:t>
             </a:fld>
             <a:endParaRPr lang="en-US"/>
           </a:p>
@@ -4839,7 +4839,7 @@
             <a:fld id="{1D8BD707-D9CF-40AE-B4C6-C98DA3205C09}" type="datetimeFigureOut">
               <a:rPr lang="en-US" smtClean="0"/>
               <a:pPr/>
-              <a:t>5/30/24</a:t>
+              <a:t>6/3/24</a:t>
             </a:fld>
             <a:endParaRPr lang="en-US"/>
           </a:p>
@@ -5121,7 +5121,7 @@
             <a:fld id="{1D8BD707-D9CF-40AE-B4C6-C98DA3205C09}" type="datetimeFigureOut">
               <a:rPr lang="en-US" smtClean="0"/>
               <a:pPr/>
-              <a:t>5/30/24</a:t>
+              <a:t>6/3/24</a:t>
             </a:fld>
             <a:endParaRPr lang="en-US"/>
           </a:p>
@@ -5537,7 +5537,7 @@
             <a:fld id="{1D8BD707-D9CF-40AE-B4C6-C98DA3205C09}" type="datetimeFigureOut">
               <a:rPr lang="en-US" smtClean="0"/>
               <a:pPr/>
-              <a:t>5/30/24</a:t>
+              <a:t>6/3/24</a:t>
             </a:fld>
             <a:endParaRPr lang="en-US"/>
           </a:p>
@@ -5651,7 +5651,7 @@
             <a:fld id="{1D8BD707-D9CF-40AE-B4C6-C98DA3205C09}" type="datetimeFigureOut">
               <a:rPr lang="en-US" smtClean="0"/>
               <a:pPr/>
-              <a:t>5/30/24</a:t>
+              <a:t>6/3/24</a:t>
             </a:fld>
             <a:endParaRPr lang="en-US"/>
           </a:p>
@@ -5743,7 +5743,7 @@
             <a:fld id="{1D8BD707-D9CF-40AE-B4C6-C98DA3205C09}" type="datetimeFigureOut">
               <a:rPr lang="en-US" smtClean="0"/>
               <a:pPr/>
-              <a:t>5/30/24</a:t>
+              <a:t>6/3/24</a:t>
             </a:fld>
             <a:endParaRPr lang="en-US"/>
           </a:p>
@@ -6015,7 +6015,7 @@
             <a:fld id="{1D8BD707-D9CF-40AE-B4C6-C98DA3205C09}" type="datetimeFigureOut">
               <a:rPr lang="en-US" smtClean="0"/>
               <a:pPr/>
-              <a:t>5/30/24</a:t>
+              <a:t>6/3/24</a:t>
             </a:fld>
             <a:endParaRPr lang="en-US"/>
           </a:p>
@@ -6264,7 +6264,7 @@
             <a:fld id="{1D8BD707-D9CF-40AE-B4C6-C98DA3205C09}" type="datetimeFigureOut">
               <a:rPr lang="en-US" smtClean="0"/>
               <a:pPr/>
-              <a:t>5/30/24</a:t>
+              <a:t>6/3/24</a:t>
             </a:fld>
             <a:endParaRPr lang="en-US"/>
           </a:p>
@@ -6472,7 +6472,7 @@
             <a:fld id="{1D8BD707-D9CF-40AE-B4C6-C98DA3205C09}" type="datetimeFigureOut">
               <a:rPr lang="en-US" smtClean="0"/>
               <a:pPr/>
-              <a:t>5/30/24</a:t>
+              <a:t>6/3/24</a:t>
             </a:fld>
             <a:endParaRPr lang="en-US"/>
           </a:p>
@@ -11877,7 +11877,7 @@
           </a:ln>
           <a:extLst>
             <a:ext uri="{C572A759-6A51-4108-AA02-DFA0A04FC94B}">
-              <ma14:wrappingTextBoxFlag xmlns="" xmlns:m="http://schemas.openxmlformats.org/officeDocument/2006/math" xmlns:a14="http://schemas.microsoft.com/office/drawing/2010/main" xmlns:ma14="http://schemas.microsoft.com/office/mac/drawingml/2011/main" val="1"/>
+              <ma14:wrappingTextBoxFlag xmlns:ma14="http://schemas.microsoft.com/office/mac/drawingml/2011/main" xmlns:a14="http://schemas.microsoft.com/office/drawing/2010/main" xmlns:m="http://schemas.openxmlformats.org/officeDocument/2006/math" xmlns="" val="1"/>
             </a:ext>
           </a:extLst>
         </p:spPr>
@@ -11932,7 +11932,7 @@
           </a:ln>
           <a:extLst>
             <a:ext uri="{C572A759-6A51-4108-AA02-DFA0A04FC94B}">
-              <ma14:wrappingTextBoxFlag xmlns="" xmlns:m="http://schemas.openxmlformats.org/officeDocument/2006/math" xmlns:a14="http://schemas.microsoft.com/office/drawing/2010/main" xmlns:ma14="http://schemas.microsoft.com/office/mac/drawingml/2011/main" val="1"/>
+              <ma14:wrappingTextBoxFlag xmlns:ma14="http://schemas.microsoft.com/office/mac/drawingml/2011/main" xmlns:a14="http://schemas.microsoft.com/office/drawing/2010/main" xmlns:m="http://schemas.openxmlformats.org/officeDocument/2006/math" xmlns="" val="1"/>
             </a:ext>
           </a:extLst>
         </p:spPr>
@@ -18319,7 +18319,7 @@
               <a:effectLst/>
               <a:extLst>
                 <a:ext uri="{C572A759-6A51-4108-AA02-DFA0A04FC94B}">
-                  <ma14:wrappingTextBoxFlag xmlns:ma14="http://schemas.microsoft.com/office/mac/drawingml/2011/main" xmlns:a14="http://schemas.microsoft.com/office/drawing/2010/main" xmlns:m="http://schemas.openxmlformats.org/officeDocument/2006/math" xmlns="" val="1"/>
+                  <ma14:wrappingTextBoxFlag xmlns="" xmlns:m="http://schemas.openxmlformats.org/officeDocument/2006/math" xmlns:a14="http://schemas.microsoft.com/office/drawing/2010/main" xmlns:ma14="http://schemas.microsoft.com/office/mac/drawingml/2011/main" val="1"/>
                 </a:ext>
               </a:extLst>
             </p:spPr>
@@ -18445,7 +18445,7 @@
               <a:effectLst/>
               <a:extLst>
                 <a:ext uri="{C572A759-6A51-4108-AA02-DFA0A04FC94B}">
-                  <ma14:wrappingTextBoxFlag xmlns:ma14="http://schemas.microsoft.com/office/mac/drawingml/2011/main" xmlns:a14="http://schemas.microsoft.com/office/drawing/2010/main" xmlns:m="http://schemas.openxmlformats.org/officeDocument/2006/math" xmlns="" val="1"/>
+                  <ma14:wrappingTextBoxFlag xmlns="" xmlns:m="http://schemas.openxmlformats.org/officeDocument/2006/math" xmlns:a14="http://schemas.microsoft.com/office/drawing/2010/main" xmlns:ma14="http://schemas.microsoft.com/office/mac/drawingml/2011/main" val="1"/>
                 </a:ext>
               </a:extLst>
             </p:spPr>
@@ -18568,7 +18568,7 @@
               <a:effectLst/>
               <a:extLst>
                 <a:ext uri="{C572A759-6A51-4108-AA02-DFA0A04FC94B}">
-                  <ma14:wrappingTextBoxFlag xmlns:ma14="http://schemas.microsoft.com/office/mac/drawingml/2011/main" xmlns:a14="http://schemas.microsoft.com/office/drawing/2010/main" xmlns:m="http://schemas.openxmlformats.org/officeDocument/2006/math" xmlns="" val="1"/>
+                  <ma14:wrappingTextBoxFlag xmlns="" xmlns:m="http://schemas.openxmlformats.org/officeDocument/2006/math" xmlns:a14="http://schemas.microsoft.com/office/drawing/2010/main" xmlns:ma14="http://schemas.microsoft.com/office/mac/drawingml/2011/main" val="1"/>
                 </a:ext>
               </a:extLst>
             </p:spPr>
@@ -18694,7 +18694,7 @@
               <a:effectLst/>
               <a:extLst>
                 <a:ext uri="{C572A759-6A51-4108-AA02-DFA0A04FC94B}">
-                  <ma14:wrappingTextBoxFlag xmlns:ma14="http://schemas.microsoft.com/office/mac/drawingml/2011/main" xmlns:a14="http://schemas.microsoft.com/office/drawing/2010/main" xmlns:m="http://schemas.openxmlformats.org/officeDocument/2006/math" xmlns="" val="1"/>
+                  <ma14:wrappingTextBoxFlag xmlns="" xmlns:m="http://schemas.openxmlformats.org/officeDocument/2006/math" xmlns:a14="http://schemas.microsoft.com/office/drawing/2010/main" xmlns:ma14="http://schemas.microsoft.com/office/mac/drawingml/2011/main" val="1"/>
                 </a:ext>
               </a:extLst>
             </p:spPr>
@@ -18862,7 +18862,7 @@
               <a:effectLst/>
               <a:extLst>
                 <a:ext uri="{C572A759-6A51-4108-AA02-DFA0A04FC94B}">
-                  <ma14:wrappingTextBoxFlag xmlns:ma14="http://schemas.microsoft.com/office/mac/drawingml/2011/main" xmlns:a14="http://schemas.microsoft.com/office/drawing/2010/main" xmlns:m="http://schemas.openxmlformats.org/officeDocument/2006/math" xmlns="" val="1"/>
+                  <ma14:wrappingTextBoxFlag xmlns="" xmlns:m="http://schemas.openxmlformats.org/officeDocument/2006/math" xmlns:a14="http://schemas.microsoft.com/office/drawing/2010/main" xmlns:ma14="http://schemas.microsoft.com/office/mac/drawingml/2011/main" val="1"/>
                 </a:ext>
               </a:extLst>
             </p:spPr>
@@ -18991,7 +18991,7 @@
               <a:effectLst/>
               <a:extLst>
                 <a:ext uri="{C572A759-6A51-4108-AA02-DFA0A04FC94B}">
-                  <ma14:wrappingTextBoxFlag xmlns:ma14="http://schemas.microsoft.com/office/mac/drawingml/2011/main" xmlns:a14="http://schemas.microsoft.com/office/drawing/2010/main" xmlns:m="http://schemas.openxmlformats.org/officeDocument/2006/math" xmlns="" val="1"/>
+                  <ma14:wrappingTextBoxFlag xmlns="" xmlns:m="http://schemas.openxmlformats.org/officeDocument/2006/math" xmlns:a14="http://schemas.microsoft.com/office/drawing/2010/main" xmlns:ma14="http://schemas.microsoft.com/office/mac/drawingml/2011/main" val="1"/>
                 </a:ext>
               </a:extLst>
             </p:spPr>
@@ -19120,7 +19120,7 @@
               <a:effectLst/>
               <a:extLst>
                 <a:ext uri="{C572A759-6A51-4108-AA02-DFA0A04FC94B}">
-                  <ma14:wrappingTextBoxFlag xmlns:ma14="http://schemas.microsoft.com/office/mac/drawingml/2011/main" xmlns:a14="http://schemas.microsoft.com/office/drawing/2010/main" xmlns:m="http://schemas.openxmlformats.org/officeDocument/2006/math" xmlns="" val="1"/>
+                  <ma14:wrappingTextBoxFlag xmlns="" xmlns:m="http://schemas.openxmlformats.org/officeDocument/2006/math" xmlns:a14="http://schemas.microsoft.com/office/drawing/2010/main" xmlns:ma14="http://schemas.microsoft.com/office/mac/drawingml/2011/main" val="1"/>
                 </a:ext>
               </a:extLst>
             </p:spPr>
@@ -19249,7 +19249,7 @@
               <a:effectLst/>
               <a:extLst>
                 <a:ext uri="{C572A759-6A51-4108-AA02-DFA0A04FC94B}">
-                  <ma14:wrappingTextBoxFlag xmlns:ma14="http://schemas.microsoft.com/office/mac/drawingml/2011/main" xmlns:a14="http://schemas.microsoft.com/office/drawing/2010/main" xmlns:m="http://schemas.openxmlformats.org/officeDocument/2006/math" xmlns="" val="1"/>
+                  <ma14:wrappingTextBoxFlag xmlns="" xmlns:m="http://schemas.openxmlformats.org/officeDocument/2006/math" xmlns:a14="http://schemas.microsoft.com/office/drawing/2010/main" xmlns:ma14="http://schemas.microsoft.com/office/mac/drawingml/2011/main" val="1"/>
                 </a:ext>
               </a:extLst>
             </p:spPr>
@@ -19375,7 +19375,7 @@
               <a:effectLst/>
               <a:extLst>
                 <a:ext uri="{C572A759-6A51-4108-AA02-DFA0A04FC94B}">
-                  <ma14:wrappingTextBoxFlag xmlns:ma14="http://schemas.microsoft.com/office/mac/drawingml/2011/main" xmlns:a14="http://schemas.microsoft.com/office/drawing/2010/main" xmlns:m="http://schemas.openxmlformats.org/officeDocument/2006/math" xmlns="" val="1"/>
+                  <ma14:wrappingTextBoxFlag xmlns="" xmlns:m="http://schemas.openxmlformats.org/officeDocument/2006/math" xmlns:a14="http://schemas.microsoft.com/office/drawing/2010/main" xmlns:ma14="http://schemas.microsoft.com/office/mac/drawingml/2011/main" val="1"/>
                 </a:ext>
               </a:extLst>
             </p:spPr>
@@ -19667,7 +19667,7 @@
         <p:spPr>
           <a:xfrm>
             <a:off x="8369774" y="4476880"/>
-            <a:ext cx="7098826" cy="1969770"/>
+            <a:ext cx="7098826" cy="2662267"/>
           </a:xfrm>
           <a:prstGeom prst="rect">
             <a:avLst/>
@@ -19687,6 +19687,12 @@
             </a:pPr>
             <a:r>
               <a:rPr lang="en-US" sz="3000" b="1" dirty="0">
+                <a:latin typeface="Montserrat" pitchFamily="2" charset="77"/>
+              </a:rPr>
+              <a:t>Q5: </a:t>
+            </a:r>
+            <a:r>
+              <a:rPr lang="en-US" sz="3000" dirty="0">
                 <a:latin typeface="Montserrat" pitchFamily="2" charset="77"/>
               </a:rPr>
               <a:t>Which programming languages have you had contact with?</a:t>
@@ -24168,7 +24174,7 @@
           </a:ln>
           <a:extLst>
             <a:ext uri="{C572A759-6A51-4108-AA02-DFA0A04FC94B}">
-              <ma14:wrappingTextBoxFlag xmlns="" xmlns:m="http://schemas.openxmlformats.org/officeDocument/2006/math" xmlns:a14="http://schemas.microsoft.com/office/drawing/2010/main" xmlns:ma14="http://schemas.microsoft.com/office/mac/drawingml/2011/main" val="1"/>
+              <ma14:wrappingTextBoxFlag xmlns:ma14="http://schemas.microsoft.com/office/mac/drawingml/2011/main" xmlns:a14="http://schemas.microsoft.com/office/drawing/2010/main" xmlns:m="http://schemas.openxmlformats.org/officeDocument/2006/math" xmlns="" val="1"/>
             </a:ext>
           </a:extLst>
         </p:spPr>
@@ -24355,7 +24361,7 @@
           </a:ln>
           <a:extLst>
             <a:ext uri="{C572A759-6A51-4108-AA02-DFA0A04FC94B}">
-              <ma14:wrappingTextBoxFlag xmlns="" xmlns:m="http://schemas.openxmlformats.org/officeDocument/2006/math" xmlns:a14="http://schemas.microsoft.com/office/drawing/2010/main" xmlns:ma14="http://schemas.microsoft.com/office/mac/drawingml/2011/main" val="1"/>
+              <ma14:wrappingTextBoxFlag xmlns:ma14="http://schemas.microsoft.com/office/mac/drawingml/2011/main" xmlns:a14="http://schemas.microsoft.com/office/drawing/2010/main" xmlns:m="http://schemas.openxmlformats.org/officeDocument/2006/math" xmlns="" val="1"/>
             </a:ext>
           </a:extLst>
         </p:spPr>
@@ -24410,7 +24416,7 @@
           </a:ln>
           <a:extLst>
             <a:ext uri="{C572A759-6A51-4108-AA02-DFA0A04FC94B}">
-              <ma14:wrappingTextBoxFlag xmlns="" xmlns:m="http://schemas.openxmlformats.org/officeDocument/2006/math" xmlns:a14="http://schemas.microsoft.com/office/drawing/2010/main" xmlns:ma14="http://schemas.microsoft.com/office/mac/drawingml/2011/main" val="1"/>
+              <ma14:wrappingTextBoxFlag xmlns:ma14="http://schemas.microsoft.com/office/mac/drawingml/2011/main" xmlns:a14="http://schemas.microsoft.com/office/drawing/2010/main" xmlns:m="http://schemas.openxmlformats.org/officeDocument/2006/math" xmlns="" val="1"/>
             </a:ext>
           </a:extLst>
         </p:spPr>
@@ -30905,7 +30911,7 @@
           </a:ln>
           <a:extLst>
             <a:ext uri="{C572A759-6A51-4108-AA02-DFA0A04FC94B}">
-              <ma14:wrappingTextBoxFlag xmlns="" xmlns:m="http://schemas.openxmlformats.org/officeDocument/2006/math" xmlns:a14="http://schemas.microsoft.com/office/drawing/2010/main" xmlns:ma14="http://schemas.microsoft.com/office/mac/drawingml/2011/main" val="1"/>
+              <ma14:wrappingTextBoxFlag xmlns:ma14="http://schemas.microsoft.com/office/mac/drawingml/2011/main" xmlns:a14="http://schemas.microsoft.com/office/drawing/2010/main" xmlns:m="http://schemas.openxmlformats.org/officeDocument/2006/math" xmlns="" val="1"/>
             </a:ext>
           </a:extLst>
         </p:spPr>
@@ -31369,7 +31375,7 @@
             </a:ln>
             <a:extLst>
               <a:ext uri="{C572A759-6A51-4108-AA02-DFA0A04FC94B}">
-                <ma14:wrappingTextBoxFlag xmlns="" xmlns:m="http://schemas.openxmlformats.org/officeDocument/2006/math" xmlns:a14="http://schemas.microsoft.com/office/drawing/2010/main" xmlns:ma14="http://schemas.microsoft.com/office/mac/drawingml/2011/main" val="1"/>
+                <ma14:wrappingTextBoxFlag xmlns:ma14="http://schemas.microsoft.com/office/mac/drawingml/2011/main" xmlns:a14="http://schemas.microsoft.com/office/drawing/2010/main" xmlns:m="http://schemas.openxmlformats.org/officeDocument/2006/math" xmlns="" val="1"/>
               </a:ext>
             </a:extLst>
           </p:spPr>
@@ -31431,7 +31437,7 @@
             </a:ln>
             <a:extLst>
               <a:ext uri="{C572A759-6A51-4108-AA02-DFA0A04FC94B}">
-                <ma14:wrappingTextBoxFlag xmlns="" xmlns:m="http://schemas.openxmlformats.org/officeDocument/2006/math" xmlns:a14="http://schemas.microsoft.com/office/drawing/2010/main" xmlns:ma14="http://schemas.microsoft.com/office/mac/drawingml/2011/main" val="1"/>
+                <ma14:wrappingTextBoxFlag xmlns:ma14="http://schemas.microsoft.com/office/mac/drawingml/2011/main" xmlns:a14="http://schemas.microsoft.com/office/drawing/2010/main" xmlns:m="http://schemas.openxmlformats.org/officeDocument/2006/math" xmlns="" val="1"/>
               </a:ext>
             </a:extLst>
           </p:spPr>
@@ -31494,7 +31500,7 @@
             </a:ln>
             <a:extLst>
               <a:ext uri="{C572A759-6A51-4108-AA02-DFA0A04FC94B}">
-                <ma14:wrappingTextBoxFlag xmlns="" xmlns:m="http://schemas.openxmlformats.org/officeDocument/2006/math" xmlns:a14="http://schemas.microsoft.com/office/drawing/2010/main" xmlns:ma14="http://schemas.microsoft.com/office/mac/drawingml/2011/main" val="1"/>
+                <ma14:wrappingTextBoxFlag xmlns:ma14="http://schemas.microsoft.com/office/mac/drawingml/2011/main" xmlns:a14="http://schemas.microsoft.com/office/drawing/2010/main" xmlns:m="http://schemas.openxmlformats.org/officeDocument/2006/math" xmlns="" val="1"/>
               </a:ext>
             </a:extLst>
           </p:spPr>
@@ -31550,7 +31556,7 @@
             </a:ln>
             <a:extLst>
               <a:ext uri="{C572A759-6A51-4108-AA02-DFA0A04FC94B}">
-                <ma14:wrappingTextBoxFlag xmlns="" xmlns:m="http://schemas.openxmlformats.org/officeDocument/2006/math" xmlns:a14="http://schemas.microsoft.com/office/drawing/2010/main" xmlns:ma14="http://schemas.microsoft.com/office/mac/drawingml/2011/main" val="1"/>
+                <ma14:wrappingTextBoxFlag xmlns:ma14="http://schemas.microsoft.com/office/mac/drawingml/2011/main" xmlns:a14="http://schemas.microsoft.com/office/drawing/2010/main" xmlns:m="http://schemas.openxmlformats.org/officeDocument/2006/math" xmlns="" val="1"/>
               </a:ext>
             </a:extLst>
           </p:spPr>
@@ -36423,26 +36429,6 @@
 </file>
 
 <file path=customXml/item1.xml><?xml version="1.0" encoding="utf-8"?>
-<p:properties xmlns:p="http://schemas.microsoft.com/office/2006/metadata/properties" xmlns:xsi="http://www.w3.org/2001/XMLSchema-instance" xmlns:pc="http://schemas.microsoft.com/office/infopath/2007/PartnerControls">
-  <documentManagement>
-    <TaxCatchAll xmlns="c12dc4f0-a365-46b3-9e07-9aae8de5ba6f" xsi:nil="true"/>
-    <lcf76f155ced4ddcb4097134ff3c332f xmlns="b30be232-03ea-456c-8192-b7ea3ce3ddcd">
-      <Terms xmlns="http://schemas.microsoft.com/office/infopath/2007/PartnerControls"/>
-    </lcf76f155ced4ddcb4097134ff3c332f>
-  </documentManagement>
-</p:properties>
-</file>
-
-<file path=customXml/item2.xml><?xml version="1.0" encoding="utf-8"?>
-<?mso-contentType ?>
-<FormTemplates xmlns="http://schemas.microsoft.com/sharepoint/v3/contenttype/forms">
-  <Display>DocumentLibraryForm</Display>
-  <Edit>DocumentLibraryForm</Edit>
-  <New>DocumentLibraryForm</New>
-</FormTemplates>
-</file>
-
-<file path=customXml/item3.xml><?xml version="1.0" encoding="utf-8"?>
 <ct:contentTypeSchema xmlns:ct="http://schemas.microsoft.com/office/2006/metadata/contentType" xmlns:ma="http://schemas.microsoft.com/office/2006/metadata/properties/metaAttributes" ct:_="" ma:_="" ma:contentTypeName="Document" ma:contentTypeID="0x010100338C0C0DDBC9B742BC44458BFD432381" ma:contentTypeVersion="16" ma:contentTypeDescription="Create a new document." ma:contentTypeScope="" ma:versionID="9e3a3b9664c02b87506af07230493c03">
   <xsd:schema xmlns:xsd="http://www.w3.org/2001/XMLSchema" xmlns:xs="http://www.w3.org/2001/XMLSchema" xmlns:p="http://schemas.microsoft.com/office/2006/metadata/properties" xmlns:ns2="b30be232-03ea-456c-8192-b7ea3ce3ddcd" xmlns:ns3="c12dc4f0-a365-46b3-9e07-9aae8de5ba6f" targetNamespace="http://schemas.microsoft.com/office/2006/metadata/properties" ma:root="true" ma:fieldsID="97668ca7a1f544c2cd9291a5bcfce177" ns2:_="" ns3:_="">
     <xsd:import namespace="b30be232-03ea-456c-8192-b7ea3ce3ddcd"/>
@@ -36685,32 +36671,27 @@
 </ct:contentTypeSchema>
 </file>
 
-<file path=customXml/itemProps1.xml><?xml version="1.0" encoding="utf-8"?>
-<ds:datastoreItem xmlns:ds="http://schemas.openxmlformats.org/officeDocument/2006/customXml" ds:itemID="{7ADE2A51-02EA-4AA8-8B29-AE3416880B26}">
-  <ds:schemaRefs>
-    <ds:schemaRef ds:uri="b30be232-03ea-456c-8192-b7ea3ce3ddcd"/>
-    <ds:schemaRef ds:uri="http://schemas.microsoft.com/office/2006/documentManagement/types"/>
-    <ds:schemaRef ds:uri="http://purl.org/dc/elements/1.1/"/>
-    <ds:schemaRef ds:uri="http://purl.org/dc/dcmitype/"/>
-    <ds:schemaRef ds:uri="http://purl.org/dc/terms/"/>
-    <ds:schemaRef ds:uri="http://schemas.microsoft.com/office/2006/metadata/properties"/>
-    <ds:schemaRef ds:uri="http://schemas.microsoft.com/office/infopath/2007/PartnerControls"/>
-    <ds:schemaRef ds:uri="http://schemas.openxmlformats.org/package/2006/metadata/core-properties"/>
-    <ds:schemaRef ds:uri="c12dc4f0-a365-46b3-9e07-9aae8de5ba6f"/>
-    <ds:schemaRef ds:uri="http://www.w3.org/XML/1998/namespace"/>
-  </ds:schemaRefs>
-</ds:datastoreItem>
+<file path=customXml/item2.xml><?xml version="1.0" encoding="utf-8"?>
+<?mso-contentType ?>
+<FormTemplates xmlns="http://schemas.microsoft.com/sharepoint/v3/contenttype/forms">
+  <Display>DocumentLibraryForm</Display>
+  <Edit>DocumentLibraryForm</Edit>
+  <New>DocumentLibraryForm</New>
+</FormTemplates>
 </file>
 
-<file path=customXml/itemProps2.xml><?xml version="1.0" encoding="utf-8"?>
-<ds:datastoreItem xmlns:ds="http://schemas.openxmlformats.org/officeDocument/2006/customXml" ds:itemID="{62192324-B2BD-44ED-9189-FD50B4E08E52}">
-  <ds:schemaRefs>
-    <ds:schemaRef ds:uri="http://schemas.microsoft.com/sharepoint/v3/contenttype/forms"/>
-  </ds:schemaRefs>
-</ds:datastoreItem>
+<file path=customXml/item3.xml><?xml version="1.0" encoding="utf-8"?>
+<p:properties xmlns:p="http://schemas.microsoft.com/office/2006/metadata/properties" xmlns:xsi="http://www.w3.org/2001/XMLSchema-instance" xmlns:pc="http://schemas.microsoft.com/office/infopath/2007/PartnerControls">
+  <documentManagement>
+    <TaxCatchAll xmlns="c12dc4f0-a365-46b3-9e07-9aae8de5ba6f" xsi:nil="true"/>
+    <lcf76f155ced4ddcb4097134ff3c332f xmlns="b30be232-03ea-456c-8192-b7ea3ce3ddcd">
+      <Terms xmlns="http://schemas.microsoft.com/office/infopath/2007/PartnerControls"/>
+    </lcf76f155ced4ddcb4097134ff3c332f>
+  </documentManagement>
+</p:properties>
 </file>
 
-<file path=customXml/itemProps3.xml><?xml version="1.0" encoding="utf-8"?>
+<file path=customXml/itemProps1.xml><?xml version="1.0" encoding="utf-8"?>
 <ds:datastoreItem xmlns:ds="http://schemas.openxmlformats.org/officeDocument/2006/customXml" ds:itemID="{B307509C-F6F5-45A5-8F96-BB1A9C2DDFA4}">
   <ds:schemaRefs>
     <ds:schemaRef ds:uri="http://schemas.microsoft.com/office/2006/metadata/contentType"/>
@@ -36729,6 +36710,31 @@
 </ds:datastoreItem>
 </file>
 
+<file path=customXml/itemProps2.xml><?xml version="1.0" encoding="utf-8"?>
+<ds:datastoreItem xmlns:ds="http://schemas.openxmlformats.org/officeDocument/2006/customXml" ds:itemID="{62192324-B2BD-44ED-9189-FD50B4E08E52}">
+  <ds:schemaRefs>
+    <ds:schemaRef ds:uri="http://schemas.microsoft.com/sharepoint/v3/contenttype/forms"/>
+  </ds:schemaRefs>
+</ds:datastoreItem>
+</file>
+
+<file path=customXml/itemProps3.xml><?xml version="1.0" encoding="utf-8"?>
+<ds:datastoreItem xmlns:ds="http://schemas.openxmlformats.org/officeDocument/2006/customXml" ds:itemID="{7ADE2A51-02EA-4AA8-8B29-AE3416880B26}">
+  <ds:schemaRefs>
+    <ds:schemaRef ds:uri="b30be232-03ea-456c-8192-b7ea3ce3ddcd"/>
+    <ds:schemaRef ds:uri="http://schemas.microsoft.com/office/2006/documentManagement/types"/>
+    <ds:schemaRef ds:uri="http://purl.org/dc/elements/1.1/"/>
+    <ds:schemaRef ds:uri="http://purl.org/dc/dcmitype/"/>
+    <ds:schemaRef ds:uri="http://purl.org/dc/terms/"/>
+    <ds:schemaRef ds:uri="http://schemas.microsoft.com/office/2006/metadata/properties"/>
+    <ds:schemaRef ds:uri="http://schemas.microsoft.com/office/infopath/2007/PartnerControls"/>
+    <ds:schemaRef ds:uri="http://schemas.openxmlformats.org/package/2006/metadata/core-properties"/>
+    <ds:schemaRef ds:uri="c12dc4f0-a365-46b3-9e07-9aae8de5ba6f"/>
+    <ds:schemaRef ds:uri="http://www.w3.org/XML/1998/namespace"/>
+  </ds:schemaRefs>
+</ds:datastoreItem>
+</file>
+
 <file path=docMetadata/LabelInfo.xml><?xml version="1.0" encoding="utf-8"?>
 <clbl:labelList xmlns:clbl="http://schemas.microsoft.com/office/2020/mipLabelMetadata">
   <clbl:label id="{6a2630e2-1ac5-455e-8217-0156b1936a76}" enabled="1" method="Standard" siteId="{a3927f91-cda1-4696-af89-8c9f1ceffa91}" contentBits="0" removed="0"/>

</xml_diff>

<commit_message>
slide show 1 updated, text cut and headers changed
</commit_message>
<xml_diff>
--- a/Slides/FHDS_Data_Collection_Part1.pptx
+++ b/Slides/FHDS_Data_Collection_Part1.pptx
@@ -11877,7 +11877,7 @@
           </a:ln>
           <a:extLst>
             <a:ext uri="{C572A759-6A51-4108-AA02-DFA0A04FC94B}">
-              <ma14:wrappingTextBoxFlag xmlns="" xmlns:m="http://schemas.openxmlformats.org/officeDocument/2006/math" xmlns:a14="http://schemas.microsoft.com/office/drawing/2010/main" xmlns:ma14="http://schemas.microsoft.com/office/mac/drawingml/2011/main" val="1"/>
+              <ma14:wrappingTextBoxFlag xmlns:ma14="http://schemas.microsoft.com/office/mac/drawingml/2011/main" xmlns:a14="http://schemas.microsoft.com/office/drawing/2010/main" xmlns:m="http://schemas.openxmlformats.org/officeDocument/2006/math" xmlns="" val="1"/>
             </a:ext>
           </a:extLst>
         </p:spPr>
@@ -11932,7 +11932,7 @@
           </a:ln>
           <a:extLst>
             <a:ext uri="{C572A759-6A51-4108-AA02-DFA0A04FC94B}">
-              <ma14:wrappingTextBoxFlag xmlns="" xmlns:m="http://schemas.openxmlformats.org/officeDocument/2006/math" xmlns:a14="http://schemas.microsoft.com/office/drawing/2010/main" xmlns:ma14="http://schemas.microsoft.com/office/mac/drawingml/2011/main" val="1"/>
+              <ma14:wrappingTextBoxFlag xmlns:ma14="http://schemas.microsoft.com/office/mac/drawingml/2011/main" xmlns:a14="http://schemas.microsoft.com/office/drawing/2010/main" xmlns:m="http://schemas.openxmlformats.org/officeDocument/2006/math" xmlns="" val="1"/>
             </a:ext>
           </a:extLst>
         </p:spPr>
@@ -13056,7 +13056,7 @@
         </p:nvSpPr>
         <p:spPr>
           <a:xfrm>
-            <a:off x="12716148" y="3409564"/>
+            <a:off x="12825900" y="3610570"/>
             <a:ext cx="3938100" cy="923330"/>
           </a:xfrm>
           <a:prstGeom prst="rect">
@@ -13294,8 +13294,8 @@
         </p:nvSpPr>
         <p:spPr>
           <a:xfrm>
-            <a:off x="12649783" y="7948539"/>
-            <a:ext cx="3258723" cy="553998"/>
+            <a:off x="12743277" y="7956947"/>
+            <a:ext cx="3258723" cy="615553"/>
           </a:xfrm>
           <a:prstGeom prst="rect">
             <a:avLst/>
@@ -13308,7 +13308,7 @@
           <a:lstStyle/>
           <a:p>
             <a:r>
-              <a:rPr lang="en-US" b="1" dirty="0">
+              <a:rPr lang="en-US" sz="2000" b="1" dirty="0">
                 <a:solidFill>
                   <a:srgbClr val="404040"/>
                 </a:solidFill>
@@ -17307,8 +17307,8 @@
         </p:nvSpPr>
         <p:spPr>
           <a:xfrm>
-            <a:off x="4622705" y="1036621"/>
-            <a:ext cx="9448801" cy="940322"/>
+            <a:off x="2489106" y="911899"/>
+            <a:ext cx="13716282" cy="940322"/>
           </a:xfrm>
           <a:prstGeom prst="rect">
             <a:avLst/>
@@ -17335,7 +17335,7 @@
                 </a:solidFill>
                 <a:latin typeface="Montserrat" pitchFamily="2" charset="77"/>
               </a:rPr>
-              <a:t>WHAT HAS CHANGED?</a:t>
+              <a:t>NEW TOOLS FOR DATA ANALYSIS</a:t>
             </a:r>
           </a:p>
         </p:txBody>
@@ -18008,7 +18008,7 @@
           </p:blipFill>
           <p:spPr bwMode="auto">
             <a:xfrm>
-              <a:off x="5301361" y="3641393"/>
+              <a:off x="5562600" y="3641393"/>
               <a:ext cx="1219200" cy="1219200"/>
             </a:xfrm>
             <a:prstGeom prst="rect">
@@ -18055,7 +18055,7 @@
           </p:blipFill>
           <p:spPr bwMode="auto">
             <a:xfrm>
-              <a:off x="7180829" y="3723174"/>
+              <a:off x="7625581" y="3723174"/>
               <a:ext cx="1137419" cy="1137419"/>
             </a:xfrm>
             <a:prstGeom prst="rect">
@@ -18319,7 +18319,7 @@
               <a:effectLst/>
               <a:extLst>
                 <a:ext uri="{C572A759-6A51-4108-AA02-DFA0A04FC94B}">
-                  <ma14:wrappingTextBoxFlag xmlns:ma14="http://schemas.microsoft.com/office/mac/drawingml/2011/main" xmlns:a14="http://schemas.microsoft.com/office/drawing/2010/main" xmlns:m="http://schemas.openxmlformats.org/officeDocument/2006/math" xmlns="" val="1"/>
+                  <ma14:wrappingTextBoxFlag xmlns="" xmlns:m="http://schemas.openxmlformats.org/officeDocument/2006/math" xmlns:a14="http://schemas.microsoft.com/office/drawing/2010/main" xmlns:ma14="http://schemas.microsoft.com/office/mac/drawingml/2011/main" val="1"/>
                 </a:ext>
               </a:extLst>
             </p:spPr>
@@ -18431,7 +18431,7 @@
             </p:nvSpPr>
             <p:spPr>
               <a:xfrm>
-                <a:off x="881889" y="71580"/>
+                <a:off x="881892" y="71580"/>
                 <a:ext cx="2252219" cy="410368"/>
               </a:xfrm>
               <a:prstGeom prst="rect">
@@ -18445,7 +18445,7 @@
               <a:effectLst/>
               <a:extLst>
                 <a:ext uri="{C572A759-6A51-4108-AA02-DFA0A04FC94B}">
-                  <ma14:wrappingTextBoxFlag xmlns:ma14="http://schemas.microsoft.com/office/mac/drawingml/2011/main" xmlns:a14="http://schemas.microsoft.com/office/drawing/2010/main" xmlns:m="http://schemas.openxmlformats.org/officeDocument/2006/math" xmlns="" val="1"/>
+                  <ma14:wrappingTextBoxFlag xmlns="" xmlns:m="http://schemas.openxmlformats.org/officeDocument/2006/math" xmlns:a14="http://schemas.microsoft.com/office/drawing/2010/main" xmlns:ma14="http://schemas.microsoft.com/office/mac/drawingml/2011/main" val="1"/>
                 </a:ext>
               </a:extLst>
             </p:spPr>
@@ -18472,8 +18472,17 @@
                   <a:rPr sz="2000" b="1" dirty="0">
                     <a:latin typeface="Montserrat" panose="00000500000000000000" pitchFamily="2" charset="0"/>
                   </a:rPr>
-                  <a:t>Data Wrangling</a:t>
+                  <a:t>Data</a:t>
                 </a:r>
+                <a:r>
+                  <a:rPr lang="en-US" sz="2000" b="1" dirty="0">
+                    <a:latin typeface="Montserrat" panose="00000500000000000000" pitchFamily="2" charset="0"/>
+                  </a:rPr>
+                  <a:t> Wrangling</a:t>
+                </a:r>
+                <a:endParaRPr sz="2000" b="1" dirty="0">
+                  <a:latin typeface="Montserrat" panose="00000500000000000000" pitchFamily="2" charset="0"/>
+                </a:endParaRPr>
               </a:p>
             </p:txBody>
           </p:sp>
@@ -18568,7 +18577,7 @@
               <a:effectLst/>
               <a:extLst>
                 <a:ext uri="{C572A759-6A51-4108-AA02-DFA0A04FC94B}">
-                  <ma14:wrappingTextBoxFlag xmlns:ma14="http://schemas.microsoft.com/office/mac/drawingml/2011/main" xmlns:a14="http://schemas.microsoft.com/office/drawing/2010/main" xmlns:m="http://schemas.openxmlformats.org/officeDocument/2006/math" xmlns="" val="1"/>
+                  <ma14:wrappingTextBoxFlag xmlns="" xmlns:m="http://schemas.openxmlformats.org/officeDocument/2006/math" xmlns:a14="http://schemas.microsoft.com/office/drawing/2010/main" xmlns:ma14="http://schemas.microsoft.com/office/mac/drawingml/2011/main" val="1"/>
                 </a:ext>
               </a:extLst>
             </p:spPr>
@@ -18680,7 +18689,7 @@
             </p:nvSpPr>
             <p:spPr>
               <a:xfrm>
-                <a:off x="744038" y="71580"/>
+                <a:off x="744038" y="118680"/>
                 <a:ext cx="2527935" cy="410368"/>
               </a:xfrm>
               <a:prstGeom prst="rect">
@@ -18694,7 +18703,7 @@
               <a:effectLst/>
               <a:extLst>
                 <a:ext uri="{C572A759-6A51-4108-AA02-DFA0A04FC94B}">
-                  <ma14:wrappingTextBoxFlag xmlns:ma14="http://schemas.microsoft.com/office/mac/drawingml/2011/main" xmlns:a14="http://schemas.microsoft.com/office/drawing/2010/main" xmlns:m="http://schemas.openxmlformats.org/officeDocument/2006/math" xmlns="" val="1"/>
+                  <ma14:wrappingTextBoxFlag xmlns="" xmlns:m="http://schemas.openxmlformats.org/officeDocument/2006/math" xmlns:a14="http://schemas.microsoft.com/office/drawing/2010/main" xmlns:ma14="http://schemas.microsoft.com/office/mac/drawingml/2011/main" val="1"/>
                 </a:ext>
               </a:extLst>
             </p:spPr>
@@ -18744,7 +18753,7 @@
           </p:nvSpPr>
           <p:spPr>
             <a:xfrm>
-              <a:off x="6563608" y="3476294"/>
+              <a:off x="6934200" y="3476294"/>
               <a:ext cx="838200" cy="1446550"/>
             </a:xfrm>
             <a:prstGeom prst="rect">
@@ -18862,7 +18871,7 @@
               <a:effectLst/>
               <a:extLst>
                 <a:ext uri="{C572A759-6A51-4108-AA02-DFA0A04FC94B}">
-                  <ma14:wrappingTextBoxFlag xmlns:ma14="http://schemas.microsoft.com/office/mac/drawingml/2011/main" xmlns:a14="http://schemas.microsoft.com/office/drawing/2010/main" xmlns:m="http://schemas.openxmlformats.org/officeDocument/2006/math" xmlns="" val="1"/>
+                  <ma14:wrappingTextBoxFlag xmlns="" xmlns:m="http://schemas.openxmlformats.org/officeDocument/2006/math" xmlns:a14="http://schemas.microsoft.com/office/drawing/2010/main" xmlns:ma14="http://schemas.microsoft.com/office/mac/drawingml/2011/main" val="1"/>
                 </a:ext>
               </a:extLst>
             </p:spPr>
@@ -18991,7 +19000,7 @@
               <a:effectLst/>
               <a:extLst>
                 <a:ext uri="{C572A759-6A51-4108-AA02-DFA0A04FC94B}">
-                  <ma14:wrappingTextBoxFlag xmlns:ma14="http://schemas.microsoft.com/office/mac/drawingml/2011/main" xmlns:a14="http://schemas.microsoft.com/office/drawing/2010/main" xmlns:m="http://schemas.openxmlformats.org/officeDocument/2006/math" xmlns="" val="1"/>
+                  <ma14:wrappingTextBoxFlag xmlns="" xmlns:m="http://schemas.openxmlformats.org/officeDocument/2006/math" xmlns:a14="http://schemas.microsoft.com/office/drawing/2010/main" xmlns:ma14="http://schemas.microsoft.com/office/mac/drawingml/2011/main" val="1"/>
                 </a:ext>
               </a:extLst>
             </p:spPr>
@@ -19120,7 +19129,7 @@
               <a:effectLst/>
               <a:extLst>
                 <a:ext uri="{C572A759-6A51-4108-AA02-DFA0A04FC94B}">
-                  <ma14:wrappingTextBoxFlag xmlns:ma14="http://schemas.microsoft.com/office/mac/drawingml/2011/main" xmlns:a14="http://schemas.microsoft.com/office/drawing/2010/main" xmlns:m="http://schemas.openxmlformats.org/officeDocument/2006/math" xmlns="" val="1"/>
+                  <ma14:wrappingTextBoxFlag xmlns="" xmlns:m="http://schemas.openxmlformats.org/officeDocument/2006/math" xmlns:a14="http://schemas.microsoft.com/office/drawing/2010/main" xmlns:ma14="http://schemas.microsoft.com/office/mac/drawingml/2011/main" val="1"/>
                 </a:ext>
               </a:extLst>
             </p:spPr>
@@ -19249,7 +19258,7 @@
               <a:effectLst/>
               <a:extLst>
                 <a:ext uri="{C572A759-6A51-4108-AA02-DFA0A04FC94B}">
-                  <ma14:wrappingTextBoxFlag xmlns:ma14="http://schemas.microsoft.com/office/mac/drawingml/2011/main" xmlns:a14="http://schemas.microsoft.com/office/drawing/2010/main" xmlns:m="http://schemas.openxmlformats.org/officeDocument/2006/math" xmlns="" val="1"/>
+                  <ma14:wrappingTextBoxFlag xmlns="" xmlns:m="http://schemas.openxmlformats.org/officeDocument/2006/math" xmlns:a14="http://schemas.microsoft.com/office/drawing/2010/main" xmlns:ma14="http://schemas.microsoft.com/office/mac/drawingml/2011/main" val="1"/>
                 </a:ext>
               </a:extLst>
             </p:spPr>
@@ -19375,7 +19384,7 @@
               <a:effectLst/>
               <a:extLst>
                 <a:ext uri="{C572A759-6A51-4108-AA02-DFA0A04FC94B}">
-                  <ma14:wrappingTextBoxFlag xmlns:ma14="http://schemas.microsoft.com/office/mac/drawingml/2011/main" xmlns:a14="http://schemas.microsoft.com/office/drawing/2010/main" xmlns:m="http://schemas.openxmlformats.org/officeDocument/2006/math" xmlns="" val="1"/>
+                  <ma14:wrappingTextBoxFlag xmlns="" xmlns:m="http://schemas.openxmlformats.org/officeDocument/2006/math" xmlns:a14="http://schemas.microsoft.com/office/drawing/2010/main" xmlns:ma14="http://schemas.microsoft.com/office/mac/drawingml/2011/main" val="1"/>
                 </a:ext>
               </a:extLst>
             </p:spPr>
@@ -24174,7 +24183,7 @@
           </a:ln>
           <a:extLst>
             <a:ext uri="{C572A759-6A51-4108-AA02-DFA0A04FC94B}">
-              <ma14:wrappingTextBoxFlag xmlns="" xmlns:m="http://schemas.openxmlformats.org/officeDocument/2006/math" xmlns:a14="http://schemas.microsoft.com/office/drawing/2010/main" xmlns:ma14="http://schemas.microsoft.com/office/mac/drawingml/2011/main" val="1"/>
+              <ma14:wrappingTextBoxFlag xmlns:ma14="http://schemas.microsoft.com/office/mac/drawingml/2011/main" xmlns:a14="http://schemas.microsoft.com/office/drawing/2010/main" xmlns:m="http://schemas.openxmlformats.org/officeDocument/2006/math" xmlns="" val="1"/>
             </a:ext>
           </a:extLst>
         </p:spPr>
@@ -24361,7 +24370,7 @@
           </a:ln>
           <a:extLst>
             <a:ext uri="{C572A759-6A51-4108-AA02-DFA0A04FC94B}">
-              <ma14:wrappingTextBoxFlag xmlns="" xmlns:m="http://schemas.openxmlformats.org/officeDocument/2006/math" xmlns:a14="http://schemas.microsoft.com/office/drawing/2010/main" xmlns:ma14="http://schemas.microsoft.com/office/mac/drawingml/2011/main" val="1"/>
+              <ma14:wrappingTextBoxFlag xmlns:ma14="http://schemas.microsoft.com/office/mac/drawingml/2011/main" xmlns:a14="http://schemas.microsoft.com/office/drawing/2010/main" xmlns:m="http://schemas.openxmlformats.org/officeDocument/2006/math" xmlns="" val="1"/>
             </a:ext>
           </a:extLst>
         </p:spPr>
@@ -24416,7 +24425,7 @@
           </a:ln>
           <a:extLst>
             <a:ext uri="{C572A759-6A51-4108-AA02-DFA0A04FC94B}">
-              <ma14:wrappingTextBoxFlag xmlns="" xmlns:m="http://schemas.openxmlformats.org/officeDocument/2006/math" xmlns:a14="http://schemas.microsoft.com/office/drawing/2010/main" xmlns:ma14="http://schemas.microsoft.com/office/mac/drawingml/2011/main" val="1"/>
+              <ma14:wrappingTextBoxFlag xmlns:ma14="http://schemas.microsoft.com/office/mac/drawingml/2011/main" xmlns:a14="http://schemas.microsoft.com/office/drawing/2010/main" xmlns:m="http://schemas.openxmlformats.org/officeDocument/2006/math" xmlns="" val="1"/>
             </a:ext>
           </a:extLst>
         </p:spPr>
@@ -28991,8 +29000,8 @@
         </p:nvSpPr>
         <p:spPr>
           <a:xfrm>
-            <a:off x="899834" y="3099129"/>
-            <a:ext cx="12820836" cy="8017259"/>
+            <a:off x="1199964" y="3160812"/>
+            <a:ext cx="12820836" cy="6279604"/>
           </a:xfrm>
           <a:prstGeom prst="rect">
             <a:avLst/>
@@ -29054,7 +29063,7 @@
                 </a:solidFill>
                 <a:latin typeface="Montserrat" pitchFamily="2" charset="77"/>
               </a:rPr>
-              <a:t>Measurement uncertainty</a:t>
+              <a:t>Measurement uncertainty (technical variation)</a:t>
             </a:r>
           </a:p>
           <a:p>
@@ -29096,7 +29105,7 @@
                 </a:solidFill>
                 <a:latin typeface="Montserrat" pitchFamily="2" charset="77"/>
               </a:rPr>
-              <a:t>Type and impact of data uncertainty &amp; biases may be known or unknown</a:t>
+              <a:t>Type and impact of of these may be known or unknown</a:t>
             </a:r>
             <a:endParaRPr lang="en-US" sz="2400" b="1" dirty="0">
               <a:solidFill>
@@ -29133,7 +29142,7 @@
                 </a:solidFill>
                 <a:latin typeface="Montserrat"/>
               </a:rPr>
-              <a:t>Datasets have:</a:t>
+              <a:t>Datasets:</a:t>
             </a:r>
           </a:p>
           <a:p>
@@ -29160,7 +29169,7 @@
                 </a:solidFill>
                 <a:latin typeface="Montserrat"/>
               </a:rPr>
-              <a:t>, the properties collected, i.e. a cell, a tissue sample</a:t>
+              <a:t>, the properties collected, i.e. a cell, a patient sample</a:t>
             </a:r>
           </a:p>
           <a:p>
@@ -29308,51 +29317,6 @@
                 <a:srgbClr val="404040"/>
               </a:solidFill>
               <a:latin typeface="Montserrat" pitchFamily="2" charset="77"/>
-            </a:endParaRPr>
-          </a:p>
-          <a:p>
-            <a:pPr marL="457200" indent="-457200">
-              <a:lnSpc>
-                <a:spcPts val="4480"/>
-              </a:lnSpc>
-              <a:buFont typeface="Arial" panose="020B0604020202020204" pitchFamily="34" charset="0"/>
-              <a:buChar char="•"/>
-            </a:pPr>
-            <a:endParaRPr lang="en-US" sz="2600" dirty="0">
-              <a:solidFill>
-                <a:srgbClr val="404040"/>
-              </a:solidFill>
-              <a:latin typeface="Montserrat" pitchFamily="2" charset="77"/>
-            </a:endParaRPr>
-          </a:p>
-          <a:p>
-            <a:pPr marL="914400" lvl="1" indent="-457200">
-              <a:lnSpc>
-                <a:spcPts val="4480"/>
-              </a:lnSpc>
-              <a:buFont typeface="Arial" panose="020B0604020202020204" pitchFamily="34" charset="0"/>
-              <a:buChar char="•"/>
-            </a:pPr>
-            <a:endParaRPr lang="en-US" sz="2600" dirty="0">
-              <a:solidFill>
-                <a:srgbClr val="404040"/>
-              </a:solidFill>
-              <a:latin typeface="Montserrat" pitchFamily="2" charset="77"/>
-            </a:endParaRPr>
-          </a:p>
-          <a:p>
-            <a:pPr marL="914400" lvl="1" indent="-457200">
-              <a:lnSpc>
-                <a:spcPts val="4480"/>
-              </a:lnSpc>
-              <a:buFont typeface="Arial" panose="020B0604020202020204" pitchFamily="34" charset="0"/>
-              <a:buChar char="•"/>
-            </a:pPr>
-            <a:endParaRPr lang="en-US" sz="2600" b="1" dirty="0">
-              <a:solidFill>
-                <a:srgbClr val="404040"/>
-              </a:solidFill>
-              <a:latin typeface="Montserrat"/>
             </a:endParaRPr>
           </a:p>
         </p:txBody>
@@ -29404,51 +29368,12 @@
           </a:p>
         </p:txBody>
       </p:sp>
-      <p:pic>
-        <p:nvPicPr>
-          <p:cNvPr id="73" name="Graphic 72" descr="Flask outline">
+      <p:grpSp>
+        <p:nvGrpSpPr>
+          <p:cNvPr id="3" name="Group 2">
             <a:extLst>
               <a:ext uri="{FF2B5EF4-FFF2-40B4-BE49-F238E27FC236}">
-                <a16:creationId xmlns:a16="http://schemas.microsoft.com/office/drawing/2014/main" id="{DF5713A8-D470-58AD-46AE-28ADB9ABE502}"/>
-              </a:ext>
-            </a:extLst>
-          </p:cNvPr>
-          <p:cNvPicPr>
-            <a:picLocks noChangeAspect="1"/>
-          </p:cNvPicPr>
-          <p:nvPr/>
-        </p:nvPicPr>
-        <p:blipFill>
-          <a:blip r:embed="rId3">
-            <a:extLst>
-              <a:ext uri="{28A0092B-C50C-407E-A947-70E740481C1C}">
-                <a14:useLocalDpi xmlns:a14="http://schemas.microsoft.com/office/drawing/2010/main" val="0"/>
-              </a:ext>
-              <a:ext uri="{96DAC541-7B7A-43D3-8B79-37D633B846F1}">
-                <asvg:svgBlip xmlns:asvg="http://schemas.microsoft.com/office/drawing/2016/SVG/main" r:embed="rId4"/>
-              </a:ext>
-            </a:extLst>
-          </a:blip>
-          <a:stretch>
-            <a:fillRect/>
-          </a:stretch>
-        </p:blipFill>
-        <p:spPr>
-          <a:xfrm rot="20081247">
-            <a:off x="14544725" y="2916734"/>
-            <a:ext cx="1321841" cy="1321841"/>
-          </a:xfrm>
-          <a:prstGeom prst="rect">
-            <a:avLst/>
-          </a:prstGeom>
-        </p:spPr>
-      </p:pic>
-      <p:grpSp>
-        <p:nvGrpSpPr>
-          <p:cNvPr id="4" name="Group 3">
-            <a:extLst>
-              <a:ext uri="{FF2B5EF4-FFF2-40B4-BE49-F238E27FC236}">
-                <a16:creationId xmlns:a16="http://schemas.microsoft.com/office/drawing/2014/main" id="{C55B7A4E-CE28-6C4A-4B7F-F6BF111E01C0}"/>
+                <a16:creationId xmlns:a16="http://schemas.microsoft.com/office/drawing/2014/main" id="{1FAE4EEC-47FD-43D8-B6D8-73E2F88743F1}"/>
               </a:ext>
             </a:extLst>
           </p:cNvPr>
@@ -29457,18 +29382,18 @@
         </p:nvGrpSpPr>
         <p:grpSpPr>
           <a:xfrm>
-            <a:off x="13313270" y="3280234"/>
-            <a:ext cx="3222130" cy="6012534"/>
-            <a:chOff x="12884793" y="3283866"/>
-            <a:chExt cx="3222130" cy="6012534"/>
+            <a:off x="13618070" y="2916734"/>
+            <a:ext cx="3222130" cy="6376034"/>
+            <a:chOff x="13313270" y="2916734"/>
+            <a:chExt cx="3222130" cy="6376034"/>
           </a:xfrm>
         </p:grpSpPr>
         <p:pic>
           <p:nvPicPr>
-            <p:cNvPr id="71" name="Graphic 70" descr="DNA outline">
+            <p:cNvPr id="73" name="Graphic 72" descr="Flask outline">
               <a:extLst>
                 <a:ext uri="{FF2B5EF4-FFF2-40B4-BE49-F238E27FC236}">
-                  <a16:creationId xmlns:a16="http://schemas.microsoft.com/office/drawing/2014/main" id="{C9550754-D800-A595-9E0E-309B072E5837}"/>
+                  <a16:creationId xmlns:a16="http://schemas.microsoft.com/office/drawing/2014/main" id="{DF5713A8-D470-58AD-46AE-28ADB9ABE502}"/>
                 </a:ext>
               </a:extLst>
             </p:cNvPr>
@@ -29478,13 +29403,13 @@
             <p:nvPr/>
           </p:nvPicPr>
           <p:blipFill>
-            <a:blip r:embed="rId5">
+            <a:blip r:embed="rId3">
               <a:extLst>
                 <a:ext uri="{28A0092B-C50C-407E-A947-70E740481C1C}">
                   <a14:useLocalDpi xmlns:a14="http://schemas.microsoft.com/office/drawing/2010/main" val="0"/>
                 </a:ext>
                 <a:ext uri="{96DAC541-7B7A-43D3-8B79-37D633B846F1}">
-                  <asvg:svgBlip xmlns:asvg="http://schemas.microsoft.com/office/drawing/2016/SVG/main" r:embed="rId6"/>
+                  <asvg:svgBlip xmlns:asvg="http://schemas.microsoft.com/office/drawing/2016/SVG/main" r:embed="rId4"/>
                 </a:ext>
               </a:extLst>
             </a:blip>
@@ -29493,21 +29418,864 @@
             </a:stretch>
           </p:blipFill>
           <p:spPr>
-            <a:xfrm rot="1199913">
-              <a:off x="13013314" y="3283866"/>
-              <a:ext cx="962120" cy="962120"/>
+            <a:xfrm rot="20081247">
+              <a:off x="14544725" y="2916734"/>
+              <a:ext cx="1321841" cy="1321841"/>
             </a:xfrm>
             <a:prstGeom prst="rect">
               <a:avLst/>
             </a:prstGeom>
           </p:spPr>
         </p:pic>
+        <p:grpSp>
+          <p:nvGrpSpPr>
+            <p:cNvPr id="4" name="Group 3">
+              <a:extLst>
+                <a:ext uri="{FF2B5EF4-FFF2-40B4-BE49-F238E27FC236}">
+                  <a16:creationId xmlns:a16="http://schemas.microsoft.com/office/drawing/2014/main" id="{C55B7A4E-CE28-6C4A-4B7F-F6BF111E01C0}"/>
+                </a:ext>
+              </a:extLst>
+            </p:cNvPr>
+            <p:cNvGrpSpPr/>
+            <p:nvPr/>
+          </p:nvGrpSpPr>
+          <p:grpSpPr>
+            <a:xfrm>
+              <a:off x="13313270" y="3280234"/>
+              <a:ext cx="3222130" cy="6012534"/>
+              <a:chOff x="12884793" y="3283866"/>
+              <a:chExt cx="3222130" cy="6012534"/>
+            </a:xfrm>
+          </p:grpSpPr>
+          <p:pic>
+            <p:nvPicPr>
+              <p:cNvPr id="71" name="Graphic 70" descr="DNA outline">
+                <a:extLst>
+                  <a:ext uri="{FF2B5EF4-FFF2-40B4-BE49-F238E27FC236}">
+                    <a16:creationId xmlns:a16="http://schemas.microsoft.com/office/drawing/2014/main" id="{C9550754-D800-A595-9E0E-309B072E5837}"/>
+                  </a:ext>
+                </a:extLst>
+              </p:cNvPr>
+              <p:cNvPicPr>
+                <a:picLocks noChangeAspect="1"/>
+              </p:cNvPicPr>
+              <p:nvPr/>
+            </p:nvPicPr>
+            <p:blipFill>
+              <a:blip r:embed="rId5">
+                <a:extLst>
+                  <a:ext uri="{28A0092B-C50C-407E-A947-70E740481C1C}">
+                    <a14:useLocalDpi xmlns:a14="http://schemas.microsoft.com/office/drawing/2010/main" val="0"/>
+                  </a:ext>
+                  <a:ext uri="{96DAC541-7B7A-43D3-8B79-37D633B846F1}">
+                    <asvg:svgBlip xmlns:asvg="http://schemas.microsoft.com/office/drawing/2016/SVG/main" r:embed="rId6"/>
+                  </a:ext>
+                </a:extLst>
+              </a:blip>
+              <a:stretch>
+                <a:fillRect/>
+              </a:stretch>
+            </p:blipFill>
+            <p:spPr>
+              <a:xfrm rot="1199913">
+                <a:off x="13013314" y="3283866"/>
+                <a:ext cx="962120" cy="962120"/>
+              </a:xfrm>
+              <a:prstGeom prst="rect">
+                <a:avLst/>
+              </a:prstGeom>
+            </p:spPr>
+          </p:pic>
+          <p:pic>
+            <p:nvPicPr>
+              <p:cNvPr id="77" name="Graphic 76" descr="Nerve outline">
+                <a:extLst>
+                  <a:ext uri="{FF2B5EF4-FFF2-40B4-BE49-F238E27FC236}">
+                    <a16:creationId xmlns:a16="http://schemas.microsoft.com/office/drawing/2014/main" id="{94F95C18-56BC-9B3A-8B6A-EEB8979FCB03}"/>
+                  </a:ext>
+                </a:extLst>
+              </p:cNvPr>
+              <p:cNvPicPr>
+                <a:picLocks noChangeAspect="1"/>
+              </p:cNvPicPr>
+              <p:nvPr/>
+            </p:nvPicPr>
+            <p:blipFill>
+              <a:blip r:embed="rId7">
+                <a:extLst>
+                  <a:ext uri="{28A0092B-C50C-407E-A947-70E740481C1C}">
+                    <a14:useLocalDpi xmlns:a14="http://schemas.microsoft.com/office/drawing/2010/main" val="0"/>
+                  </a:ext>
+                  <a:ext uri="{96DAC541-7B7A-43D3-8B79-37D633B846F1}">
+                    <asvg:svgBlip xmlns:asvg="http://schemas.microsoft.com/office/drawing/2016/SVG/main" r:embed="rId8"/>
+                  </a:ext>
+                </a:extLst>
+              </a:blip>
+              <a:stretch>
+                <a:fillRect/>
+              </a:stretch>
+            </p:blipFill>
+            <p:spPr>
+              <a:xfrm rot="14023820">
+                <a:off x="14842030" y="4101327"/>
+                <a:ext cx="1264893" cy="1264893"/>
+              </a:xfrm>
+              <a:prstGeom prst="rect">
+                <a:avLst/>
+              </a:prstGeom>
+            </p:spPr>
+          </p:pic>
+          <p:pic>
+            <p:nvPicPr>
+              <p:cNvPr id="79" name="Graphic 78" descr="Petri Dish outline">
+                <a:extLst>
+                  <a:ext uri="{FF2B5EF4-FFF2-40B4-BE49-F238E27FC236}">
+                    <a16:creationId xmlns:a16="http://schemas.microsoft.com/office/drawing/2014/main" id="{1B21C7D8-A71A-F622-C371-1DD4CBB6F6F6}"/>
+                  </a:ext>
+                </a:extLst>
+              </p:cNvPr>
+              <p:cNvPicPr>
+                <a:picLocks noChangeAspect="1"/>
+              </p:cNvPicPr>
+              <p:nvPr/>
+            </p:nvPicPr>
+            <p:blipFill>
+              <a:blip r:embed="rId9">
+                <a:extLst>
+                  <a:ext uri="{28A0092B-C50C-407E-A947-70E740481C1C}">
+                    <a14:useLocalDpi xmlns:a14="http://schemas.microsoft.com/office/drawing/2010/main" val="0"/>
+                  </a:ext>
+                  <a:ext uri="{96DAC541-7B7A-43D3-8B79-37D633B846F1}">
+                    <asvg:svgBlip xmlns:asvg="http://schemas.microsoft.com/office/drawing/2016/SVG/main" r:embed="rId10"/>
+                  </a:ext>
+                </a:extLst>
+              </a:blip>
+              <a:stretch>
+                <a:fillRect/>
+              </a:stretch>
+            </p:blipFill>
+            <p:spPr>
+              <a:xfrm>
+                <a:off x="15012602" y="5170591"/>
+                <a:ext cx="962120" cy="962120"/>
+              </a:xfrm>
+              <a:prstGeom prst="rect">
+                <a:avLst/>
+              </a:prstGeom>
+            </p:spPr>
+          </p:pic>
+          <p:pic>
+            <p:nvPicPr>
+              <p:cNvPr id="81" name="Graphic 80" descr="Atom outline">
+                <a:extLst>
+                  <a:ext uri="{FF2B5EF4-FFF2-40B4-BE49-F238E27FC236}">
+                    <a16:creationId xmlns:a16="http://schemas.microsoft.com/office/drawing/2014/main" id="{06C19A85-E002-FC2D-F19D-B1BCFB84D586}"/>
+                  </a:ext>
+                </a:extLst>
+              </p:cNvPr>
+              <p:cNvPicPr>
+                <a:picLocks noChangeAspect="1"/>
+              </p:cNvPicPr>
+              <p:nvPr/>
+            </p:nvPicPr>
+            <p:blipFill>
+              <a:blip r:embed="rId11">
+                <a:extLst>
+                  <a:ext uri="{28A0092B-C50C-407E-A947-70E740481C1C}">
+                    <a14:useLocalDpi xmlns:a14="http://schemas.microsoft.com/office/drawing/2010/main" val="0"/>
+                  </a:ext>
+                  <a:ext uri="{96DAC541-7B7A-43D3-8B79-37D633B846F1}">
+                    <asvg:svgBlip xmlns:asvg="http://schemas.microsoft.com/office/drawing/2016/SVG/main" r:embed="rId12"/>
+                  </a:ext>
+                </a:extLst>
+              </a:blip>
+              <a:stretch>
+                <a:fillRect/>
+              </a:stretch>
+            </p:blipFill>
+            <p:spPr>
+              <a:xfrm>
+                <a:off x="13639800" y="3571919"/>
+                <a:ext cx="962120" cy="962120"/>
+              </a:xfrm>
+              <a:prstGeom prst="rect">
+                <a:avLst/>
+              </a:prstGeom>
+            </p:spPr>
+          </p:pic>
+          <p:pic>
+            <p:nvPicPr>
+              <p:cNvPr id="83" name="Graphic 82" descr="Tooth outline">
+                <a:extLst>
+                  <a:ext uri="{FF2B5EF4-FFF2-40B4-BE49-F238E27FC236}">
+                    <a16:creationId xmlns:a16="http://schemas.microsoft.com/office/drawing/2014/main" id="{ABA54CD3-28D5-CA4B-16B7-09ABE8095ADB}"/>
+                  </a:ext>
+                </a:extLst>
+              </p:cNvPr>
+              <p:cNvPicPr>
+                <a:picLocks noChangeAspect="1"/>
+              </p:cNvPicPr>
+              <p:nvPr/>
+            </p:nvPicPr>
+            <p:blipFill>
+              <a:blip r:embed="rId13">
+                <a:extLst>
+                  <a:ext uri="{28A0092B-C50C-407E-A947-70E740481C1C}">
+                    <a14:useLocalDpi xmlns:a14="http://schemas.microsoft.com/office/drawing/2010/main" val="0"/>
+                  </a:ext>
+                  <a:ext uri="{96DAC541-7B7A-43D3-8B79-37D633B846F1}">
+                    <asvg:svgBlip xmlns:asvg="http://schemas.microsoft.com/office/drawing/2016/SVG/main" r:embed="rId14"/>
+                  </a:ext>
+                </a:extLst>
+              </a:blip>
+              <a:stretch>
+                <a:fillRect/>
+              </a:stretch>
+            </p:blipFill>
+            <p:spPr>
+              <a:xfrm rot="905948">
+                <a:off x="13573820" y="5364291"/>
+                <a:ext cx="850705" cy="850705"/>
+              </a:xfrm>
+              <a:prstGeom prst="rect">
+                <a:avLst/>
+              </a:prstGeom>
+            </p:spPr>
+          </p:pic>
+          <p:pic>
+            <p:nvPicPr>
+              <p:cNvPr id="89" name="Graphic 88" descr="Heart organ outline">
+                <a:extLst>
+                  <a:ext uri="{FF2B5EF4-FFF2-40B4-BE49-F238E27FC236}">
+                    <a16:creationId xmlns:a16="http://schemas.microsoft.com/office/drawing/2014/main" id="{EA74EE58-6153-AA25-EC7B-1A8627F5D5CB}"/>
+                  </a:ext>
+                </a:extLst>
+              </p:cNvPr>
+              <p:cNvPicPr>
+                <a:picLocks noChangeAspect="1"/>
+              </p:cNvPicPr>
+              <p:nvPr/>
+            </p:nvPicPr>
+            <p:blipFill>
+              <a:blip r:embed="rId15">
+                <a:extLst>
+                  <a:ext uri="{28A0092B-C50C-407E-A947-70E740481C1C}">
+                    <a14:useLocalDpi xmlns:a14="http://schemas.microsoft.com/office/drawing/2010/main" val="0"/>
+                  </a:ext>
+                  <a:ext uri="{96DAC541-7B7A-43D3-8B79-37D633B846F1}">
+                    <asvg:svgBlip xmlns:asvg="http://schemas.microsoft.com/office/drawing/2016/SVG/main" r:embed="rId16"/>
+                  </a:ext>
+                </a:extLst>
+              </a:blip>
+              <a:stretch>
+                <a:fillRect/>
+              </a:stretch>
+            </p:blipFill>
+            <p:spPr>
+              <a:xfrm>
+                <a:off x="12884793" y="4977370"/>
+                <a:ext cx="907407" cy="907407"/>
+              </a:xfrm>
+              <a:prstGeom prst="rect">
+                <a:avLst/>
+              </a:prstGeom>
+            </p:spPr>
+          </p:pic>
+          <p:pic>
+            <p:nvPicPr>
+              <p:cNvPr id="91" name="Graphic 90" descr="Kidneys outline">
+                <a:extLst>
+                  <a:ext uri="{FF2B5EF4-FFF2-40B4-BE49-F238E27FC236}">
+                    <a16:creationId xmlns:a16="http://schemas.microsoft.com/office/drawing/2014/main" id="{CB027AD1-2E9A-CA90-7111-FBDE0F4C7011}"/>
+                  </a:ext>
+                </a:extLst>
+              </p:cNvPr>
+              <p:cNvPicPr>
+                <a:picLocks noChangeAspect="1"/>
+              </p:cNvPicPr>
+              <p:nvPr/>
+            </p:nvPicPr>
+            <p:blipFill>
+              <a:blip r:embed="rId17">
+                <a:extLst>
+                  <a:ext uri="{28A0092B-C50C-407E-A947-70E740481C1C}">
+                    <a14:useLocalDpi xmlns:a14="http://schemas.microsoft.com/office/drawing/2010/main" val="0"/>
+                  </a:ext>
+                  <a:ext uri="{96DAC541-7B7A-43D3-8B79-37D633B846F1}">
+                    <asvg:svgBlip xmlns:asvg="http://schemas.microsoft.com/office/drawing/2016/SVG/main" r:embed="rId18"/>
+                  </a:ext>
+                </a:extLst>
+              </a:blip>
+              <a:stretch>
+                <a:fillRect/>
+              </a:stretch>
+            </p:blipFill>
+            <p:spPr>
+              <a:xfrm rot="20507731">
+                <a:off x="13620963" y="4542990"/>
+                <a:ext cx="853137" cy="853137"/>
+              </a:xfrm>
+              <a:prstGeom prst="rect">
+                <a:avLst/>
+              </a:prstGeom>
+            </p:spPr>
+          </p:pic>
+          <p:grpSp>
+            <p:nvGrpSpPr>
+              <p:cNvPr id="127" name="Group 126">
+                <a:extLst>
+                  <a:ext uri="{FF2B5EF4-FFF2-40B4-BE49-F238E27FC236}">
+                    <a16:creationId xmlns:a16="http://schemas.microsoft.com/office/drawing/2014/main" id="{5BFB37AF-A2F8-9FF9-876D-0F97E68FC60A}"/>
+                  </a:ext>
+                </a:extLst>
+              </p:cNvPr>
+              <p:cNvGrpSpPr/>
+              <p:nvPr/>
+            </p:nvGrpSpPr>
+            <p:grpSpPr>
+              <a:xfrm>
+                <a:off x="13412331" y="6247347"/>
+                <a:ext cx="2646022" cy="3049053"/>
+                <a:chOff x="14094585" y="6970076"/>
+                <a:chExt cx="2219802" cy="2438597"/>
+              </a:xfrm>
+            </p:grpSpPr>
+            <p:sp>
+              <p:nvSpPr>
+                <p:cNvPr id="57" name="Shape">
+                  <a:extLst>
+                    <a:ext uri="{FF2B5EF4-FFF2-40B4-BE49-F238E27FC236}">
+                      <a16:creationId xmlns:a16="http://schemas.microsoft.com/office/drawing/2014/main" id="{815B5E53-E17E-5827-E3E9-92EA6CBC973A}"/>
+                    </a:ext>
+                  </a:extLst>
+                </p:cNvPr>
+                <p:cNvSpPr/>
+                <p:nvPr/>
+              </p:nvSpPr>
+              <p:spPr>
+                <a:xfrm>
+                  <a:off x="14094585" y="6970076"/>
+                  <a:ext cx="2219802" cy="2438597"/>
+                </a:xfrm>
+                <a:custGeom>
+                  <a:avLst/>
+                  <a:gdLst/>
+                  <a:ahLst/>
+                  <a:cxnLst>
+                    <a:cxn ang="0">
+                      <a:pos x="wd2" y="hd2"/>
+                    </a:cxn>
+                    <a:cxn ang="5400000">
+                      <a:pos x="wd2" y="hd2"/>
+                    </a:cxn>
+                    <a:cxn ang="10800000">
+                      <a:pos x="wd2" y="hd2"/>
+                    </a:cxn>
+                    <a:cxn ang="16200000">
+                      <a:pos x="wd2" y="hd2"/>
+                    </a:cxn>
+                  </a:cxnLst>
+                  <a:rect l="0" t="0" r="r" b="b"/>
+                  <a:pathLst>
+                    <a:path w="21600" h="21600" extrusionOk="0">
+                      <a:moveTo>
+                        <a:pt x="21093" y="2752"/>
+                      </a:moveTo>
+                      <a:cubicBezTo>
+                        <a:pt x="20687" y="2285"/>
+                        <a:pt x="18406" y="467"/>
+                        <a:pt x="17949" y="467"/>
+                      </a:cubicBezTo>
+                      <a:cubicBezTo>
+                        <a:pt x="17949" y="0"/>
+                        <a:pt x="17087" y="0"/>
+                        <a:pt x="16631" y="0"/>
+                      </a:cubicBezTo>
+                      <a:cubicBezTo>
+                        <a:pt x="4513" y="0"/>
+                        <a:pt x="4513" y="0"/>
+                        <a:pt x="4513" y="0"/>
+                      </a:cubicBezTo>
+                      <a:cubicBezTo>
+                        <a:pt x="4513" y="0"/>
+                        <a:pt x="3651" y="0"/>
+                        <a:pt x="3144" y="467"/>
+                      </a:cubicBezTo>
+                      <a:cubicBezTo>
+                        <a:pt x="3144" y="467"/>
+                        <a:pt x="913" y="2285"/>
+                        <a:pt x="456" y="2752"/>
+                      </a:cubicBezTo>
+                      <a:cubicBezTo>
+                        <a:pt x="0" y="2752"/>
+                        <a:pt x="0" y="3219"/>
+                        <a:pt x="0" y="4154"/>
+                      </a:cubicBezTo>
+                      <a:cubicBezTo>
+                        <a:pt x="0" y="4569"/>
+                        <a:pt x="2231" y="20717"/>
+                        <a:pt x="2231" y="20717"/>
+                      </a:cubicBezTo>
+                      <a:cubicBezTo>
+                        <a:pt x="2687" y="21133"/>
+                        <a:pt x="3144" y="21600"/>
+                        <a:pt x="3651" y="21600"/>
+                      </a:cubicBezTo>
+                      <a:cubicBezTo>
+                        <a:pt x="17949" y="21600"/>
+                        <a:pt x="17949" y="21600"/>
+                        <a:pt x="17949" y="21600"/>
+                      </a:cubicBezTo>
+                      <a:cubicBezTo>
+                        <a:pt x="18406" y="21600"/>
+                        <a:pt x="18862" y="21133"/>
+                        <a:pt x="19318" y="20717"/>
+                      </a:cubicBezTo>
+                      <a:cubicBezTo>
+                        <a:pt x="19318" y="20717"/>
+                        <a:pt x="21600" y="4569"/>
+                        <a:pt x="21600" y="4154"/>
+                      </a:cubicBezTo>
+                      <a:cubicBezTo>
+                        <a:pt x="21600" y="3219"/>
+                        <a:pt x="21093" y="2752"/>
+                        <a:pt x="21093" y="2752"/>
+                      </a:cubicBezTo>
+                      <a:close/>
+                      <a:moveTo>
+                        <a:pt x="10800" y="13812"/>
+                      </a:moveTo>
+                      <a:cubicBezTo>
+                        <a:pt x="6744" y="13812"/>
+                        <a:pt x="5882" y="7788"/>
+                        <a:pt x="5425" y="6438"/>
+                      </a:cubicBezTo>
+                      <a:cubicBezTo>
+                        <a:pt x="8113" y="6438"/>
+                        <a:pt x="8113" y="6438"/>
+                        <a:pt x="8113" y="6438"/>
+                      </a:cubicBezTo>
+                      <a:cubicBezTo>
+                        <a:pt x="8113" y="8256"/>
+                        <a:pt x="9025" y="11527"/>
+                        <a:pt x="10800" y="11527"/>
+                      </a:cubicBezTo>
+                      <a:cubicBezTo>
+                        <a:pt x="12575" y="11527"/>
+                        <a:pt x="13031" y="8256"/>
+                        <a:pt x="13487" y="6438"/>
+                      </a:cubicBezTo>
+                      <a:cubicBezTo>
+                        <a:pt x="15718" y="6438"/>
+                        <a:pt x="15718" y="6438"/>
+                        <a:pt x="15718" y="6438"/>
+                      </a:cubicBezTo>
+                      <a:cubicBezTo>
+                        <a:pt x="15718" y="7788"/>
+                        <a:pt x="14856" y="13812"/>
+                        <a:pt x="10800" y="13812"/>
+                      </a:cubicBezTo>
+                      <a:close/>
+                      <a:moveTo>
+                        <a:pt x="1825" y="4154"/>
+                      </a:moveTo>
+                      <a:cubicBezTo>
+                        <a:pt x="4513" y="1402"/>
+                        <a:pt x="4513" y="1402"/>
+                        <a:pt x="4513" y="1402"/>
+                      </a:cubicBezTo>
+                      <a:cubicBezTo>
+                        <a:pt x="16631" y="1402"/>
+                        <a:pt x="16631" y="1402"/>
+                        <a:pt x="16631" y="1402"/>
+                      </a:cubicBezTo>
+                      <a:cubicBezTo>
+                        <a:pt x="19825" y="4154"/>
+                        <a:pt x="19825" y="4154"/>
+                        <a:pt x="19825" y="4154"/>
+                      </a:cubicBezTo>
+                      <a:lnTo>
+                        <a:pt x="1825" y="4154"/>
+                      </a:lnTo>
+                      <a:close/>
+                    </a:path>
+                  </a:pathLst>
+                </a:custGeom>
+                <a:solidFill>
+                  <a:srgbClr val="8EB4E3"/>
+                </a:solidFill>
+                <a:ln w="12700">
+                  <a:noFill/>
+                  <a:miter lim="400000"/>
+                </a:ln>
+              </p:spPr>
+              <p:txBody>
+                <a:bodyPr lIns="121919" tIns="121919" rIns="121919" bIns="121919" anchor="ctr"/>
+                <a:lstStyle/>
+                <a:p>
+                  <a:endParaRPr/>
+                </a:p>
+              </p:txBody>
+            </p:sp>
+            <p:sp>
+              <p:nvSpPr>
+                <p:cNvPr id="126" name="Rectangle 125">
+                  <a:extLst>
+                    <a:ext uri="{FF2B5EF4-FFF2-40B4-BE49-F238E27FC236}">
+                      <a16:creationId xmlns:a16="http://schemas.microsoft.com/office/drawing/2014/main" id="{D7171D63-93D7-E890-0B1E-9E1E050E8F65}"/>
+                    </a:ext>
+                  </a:extLst>
+                </p:cNvPr>
+                <p:cNvSpPr/>
+                <p:nvPr/>
+              </p:nvSpPr>
+              <p:spPr>
+                <a:xfrm>
+                  <a:off x="14554843" y="7633330"/>
+                  <a:ext cx="1343025" cy="1037511"/>
+                </a:xfrm>
+                <a:prstGeom prst="rect">
+                  <a:avLst/>
+                </a:prstGeom>
+                <a:solidFill>
+                  <a:srgbClr val="8EB4E3"/>
+                </a:solidFill>
+                <a:ln>
+                  <a:noFill/>
+                </a:ln>
+              </p:spPr>
+              <p:style>
+                <a:lnRef idx="2">
+                  <a:schemeClr val="accent1">
+                    <a:shade val="50000"/>
+                  </a:schemeClr>
+                </a:lnRef>
+                <a:fillRef idx="1">
+                  <a:schemeClr val="accent1"/>
+                </a:fillRef>
+                <a:effectRef idx="0">
+                  <a:schemeClr val="accent1"/>
+                </a:effectRef>
+                <a:fontRef idx="minor">
+                  <a:schemeClr val="lt1"/>
+                </a:fontRef>
+              </p:style>
+              <p:txBody>
+                <a:bodyPr rtlCol="0" anchor="ctr"/>
+                <a:lstStyle/>
+                <a:p>
+                  <a:pPr algn="ctr"/>
+                  <a:endParaRPr lang="en-DK"/>
+                </a:p>
+              </p:txBody>
+            </p:sp>
+          </p:grpSp>
+          <p:cxnSp>
+            <p:nvCxnSpPr>
+              <p:cNvPr id="128" name="Straight Connector 127">
+                <a:extLst>
+                  <a:ext uri="{FF2B5EF4-FFF2-40B4-BE49-F238E27FC236}">
+                    <a16:creationId xmlns:a16="http://schemas.microsoft.com/office/drawing/2014/main" id="{DF6C8A1E-00C8-FCB8-1C95-807CA7DE9751}"/>
+                  </a:ext>
+                </a:extLst>
+              </p:cNvPr>
+              <p:cNvCxnSpPr>
+                <a:cxnSpLocks/>
+              </p:cNvCxnSpPr>
+              <p:nvPr/>
+            </p:nvCxnSpPr>
+            <p:spPr>
+              <a:xfrm flipV="1">
+                <a:off x="14775688" y="5170591"/>
+                <a:ext cx="0" cy="1518908"/>
+              </a:xfrm>
+              <a:prstGeom prst="line">
+                <a:avLst/>
+              </a:prstGeom>
+              <a:ln w="53975">
+                <a:solidFill>
+                  <a:srgbClr val="404040"/>
+                </a:solidFill>
+                <a:headEnd type="arrow"/>
+              </a:ln>
+            </p:spPr>
+            <p:style>
+              <a:lnRef idx="1">
+                <a:schemeClr val="accent1"/>
+              </a:lnRef>
+              <a:fillRef idx="0">
+                <a:schemeClr val="accent1"/>
+              </a:fillRef>
+              <a:effectRef idx="0">
+                <a:schemeClr val="accent1"/>
+              </a:effectRef>
+              <a:fontRef idx="minor">
+                <a:schemeClr val="tx1"/>
+              </a:fontRef>
+            </p:style>
+          </p:cxnSp>
+          <p:grpSp>
+            <p:nvGrpSpPr>
+              <p:cNvPr id="129" name="Group 128">
+                <a:extLst>
+                  <a:ext uri="{FF2B5EF4-FFF2-40B4-BE49-F238E27FC236}">
+                    <a16:creationId xmlns:a16="http://schemas.microsoft.com/office/drawing/2014/main" id="{F172C642-12CC-BE0F-C5E4-EA4B2F5D0A4D}"/>
+                  </a:ext>
+                </a:extLst>
+              </p:cNvPr>
+              <p:cNvGrpSpPr/>
+              <p:nvPr/>
+            </p:nvGrpSpPr>
+            <p:grpSpPr>
+              <a:xfrm>
+                <a:off x="13735578" y="7173074"/>
+                <a:ext cx="2074288" cy="1623823"/>
+                <a:chOff x="12649200" y="2046966"/>
+                <a:chExt cx="1328927" cy="962934"/>
+              </a:xfrm>
+            </p:grpSpPr>
+            <p:pic>
+              <p:nvPicPr>
+                <p:cNvPr id="130" name="Graphic 129" descr="Binary outline">
+                  <a:extLst>
+                    <a:ext uri="{FF2B5EF4-FFF2-40B4-BE49-F238E27FC236}">
+                      <a16:creationId xmlns:a16="http://schemas.microsoft.com/office/drawing/2014/main" id="{EB7020B5-B836-1B55-284C-CDD70A322FBD}"/>
+                    </a:ext>
+                  </a:extLst>
+                </p:cNvPr>
+                <p:cNvPicPr>
+                  <a:picLocks noChangeAspect="1"/>
+                </p:cNvPicPr>
+                <p:nvPr/>
+              </p:nvPicPr>
+              <p:blipFill>
+                <a:blip r:embed="rId19">
+                  <a:extLst>
+                    <a:ext uri="{28A0092B-C50C-407E-A947-70E740481C1C}">
+                      <a14:useLocalDpi xmlns:a14="http://schemas.microsoft.com/office/drawing/2010/main" val="0"/>
+                    </a:ext>
+                    <a:ext uri="{96DAC541-7B7A-43D3-8B79-37D633B846F1}">
+                      <asvg:svgBlip xmlns:asvg="http://schemas.microsoft.com/office/drawing/2016/SVG/main" r:embed="rId20"/>
+                    </a:ext>
+                  </a:extLst>
+                </a:blip>
+                <a:stretch>
+                  <a:fillRect/>
+                </a:stretch>
+              </p:blipFill>
+              <p:spPr>
+                <a:xfrm>
+                  <a:off x="12649200" y="2046966"/>
+                  <a:ext cx="505734" cy="505734"/>
+                </a:xfrm>
+                <a:prstGeom prst="rect">
+                  <a:avLst/>
+                </a:prstGeom>
+              </p:spPr>
+            </p:pic>
+            <p:pic>
+              <p:nvPicPr>
+                <p:cNvPr id="131" name="Graphic 130" descr="Binary outline">
+                  <a:extLst>
+                    <a:ext uri="{FF2B5EF4-FFF2-40B4-BE49-F238E27FC236}">
+                      <a16:creationId xmlns:a16="http://schemas.microsoft.com/office/drawing/2014/main" id="{3D33BB2A-62AA-78BF-27A7-BFD4F3FF276B}"/>
+                    </a:ext>
+                  </a:extLst>
+                </p:cNvPr>
+                <p:cNvPicPr>
+                  <a:picLocks noChangeAspect="1"/>
+                </p:cNvPicPr>
+                <p:nvPr/>
+              </p:nvPicPr>
+              <p:blipFill>
+                <a:blip r:embed="rId19">
+                  <a:extLst>
+                    <a:ext uri="{28A0092B-C50C-407E-A947-70E740481C1C}">
+                      <a14:useLocalDpi xmlns:a14="http://schemas.microsoft.com/office/drawing/2010/main" val="0"/>
+                    </a:ext>
+                    <a:ext uri="{96DAC541-7B7A-43D3-8B79-37D633B846F1}">
+                      <asvg:svgBlip xmlns:asvg="http://schemas.microsoft.com/office/drawing/2016/SVG/main" r:embed="rId20"/>
+                    </a:ext>
+                  </a:extLst>
+                </a:blip>
+                <a:stretch>
+                  <a:fillRect/>
+                </a:stretch>
+              </p:blipFill>
+              <p:spPr>
+                <a:xfrm>
+                  <a:off x="13057866" y="2046966"/>
+                  <a:ext cx="505734" cy="505734"/>
+                </a:xfrm>
+                <a:prstGeom prst="rect">
+                  <a:avLst/>
+                </a:prstGeom>
+              </p:spPr>
+            </p:pic>
+            <p:pic>
+              <p:nvPicPr>
+                <p:cNvPr id="132" name="Graphic 131" descr="Binary outline">
+                  <a:extLst>
+                    <a:ext uri="{FF2B5EF4-FFF2-40B4-BE49-F238E27FC236}">
+                      <a16:creationId xmlns:a16="http://schemas.microsoft.com/office/drawing/2014/main" id="{69599159-B020-7730-31A9-738EF212A543}"/>
+                    </a:ext>
+                  </a:extLst>
+                </p:cNvPr>
+                <p:cNvPicPr>
+                  <a:picLocks noChangeAspect="1"/>
+                </p:cNvPicPr>
+                <p:nvPr/>
+              </p:nvPicPr>
+              <p:blipFill>
+                <a:blip r:embed="rId19">
+                  <a:extLst>
+                    <a:ext uri="{28A0092B-C50C-407E-A947-70E740481C1C}">
+                      <a14:useLocalDpi xmlns:a14="http://schemas.microsoft.com/office/drawing/2010/main" val="0"/>
+                    </a:ext>
+                    <a:ext uri="{96DAC541-7B7A-43D3-8B79-37D633B846F1}">
+                      <asvg:svgBlip xmlns:asvg="http://schemas.microsoft.com/office/drawing/2016/SVG/main" r:embed="rId20"/>
+                    </a:ext>
+                  </a:extLst>
+                </a:blip>
+                <a:stretch>
+                  <a:fillRect/>
+                </a:stretch>
+              </p:blipFill>
+              <p:spPr>
+                <a:xfrm>
+                  <a:off x="12649200" y="2504166"/>
+                  <a:ext cx="505734" cy="505734"/>
+                </a:xfrm>
+                <a:prstGeom prst="rect">
+                  <a:avLst/>
+                </a:prstGeom>
+              </p:spPr>
+            </p:pic>
+            <p:pic>
+              <p:nvPicPr>
+                <p:cNvPr id="133" name="Graphic 132" descr="Binary outline">
+                  <a:extLst>
+                    <a:ext uri="{FF2B5EF4-FFF2-40B4-BE49-F238E27FC236}">
+                      <a16:creationId xmlns:a16="http://schemas.microsoft.com/office/drawing/2014/main" id="{7214BDC9-0B9B-E4D0-4E74-DEB6473CA4CC}"/>
+                    </a:ext>
+                  </a:extLst>
+                </p:cNvPr>
+                <p:cNvPicPr>
+                  <a:picLocks noChangeAspect="1"/>
+                </p:cNvPicPr>
+                <p:nvPr/>
+              </p:nvPicPr>
+              <p:blipFill>
+                <a:blip r:embed="rId19">
+                  <a:extLst>
+                    <a:ext uri="{28A0092B-C50C-407E-A947-70E740481C1C}">
+                      <a14:useLocalDpi xmlns:a14="http://schemas.microsoft.com/office/drawing/2010/main" val="0"/>
+                    </a:ext>
+                    <a:ext uri="{96DAC541-7B7A-43D3-8B79-37D633B846F1}">
+                      <asvg:svgBlip xmlns:asvg="http://schemas.microsoft.com/office/drawing/2016/SVG/main" r:embed="rId20"/>
+                    </a:ext>
+                  </a:extLst>
+                </a:blip>
+                <a:stretch>
+                  <a:fillRect/>
+                </a:stretch>
+              </p:blipFill>
+              <p:spPr>
+                <a:xfrm>
+                  <a:off x="13057866" y="2504166"/>
+                  <a:ext cx="505734" cy="505734"/>
+                </a:xfrm>
+                <a:prstGeom prst="rect">
+                  <a:avLst/>
+                </a:prstGeom>
+              </p:spPr>
+            </p:pic>
+            <p:pic>
+              <p:nvPicPr>
+                <p:cNvPr id="134" name="Graphic 133" descr="Binary outline">
+                  <a:extLst>
+                    <a:ext uri="{FF2B5EF4-FFF2-40B4-BE49-F238E27FC236}">
+                      <a16:creationId xmlns:a16="http://schemas.microsoft.com/office/drawing/2014/main" id="{C992B9DF-EA9F-3CB5-FF16-CE7926DF5021}"/>
+                    </a:ext>
+                  </a:extLst>
+                </p:cNvPr>
+                <p:cNvPicPr>
+                  <a:picLocks noChangeAspect="1"/>
+                </p:cNvPicPr>
+                <p:nvPr/>
+              </p:nvPicPr>
+              <p:blipFill>
+                <a:blip r:embed="rId19">
+                  <a:extLst>
+                    <a:ext uri="{28A0092B-C50C-407E-A947-70E740481C1C}">
+                      <a14:useLocalDpi xmlns:a14="http://schemas.microsoft.com/office/drawing/2010/main" val="0"/>
+                    </a:ext>
+                    <a:ext uri="{96DAC541-7B7A-43D3-8B79-37D633B846F1}">
+                      <asvg:svgBlip xmlns:asvg="http://schemas.microsoft.com/office/drawing/2016/SVG/main" r:embed="rId20"/>
+                    </a:ext>
+                  </a:extLst>
+                </a:blip>
+                <a:stretch>
+                  <a:fillRect/>
+                </a:stretch>
+              </p:blipFill>
+              <p:spPr>
+                <a:xfrm>
+                  <a:off x="13472393" y="2046966"/>
+                  <a:ext cx="505734" cy="505734"/>
+                </a:xfrm>
+                <a:prstGeom prst="rect">
+                  <a:avLst/>
+                </a:prstGeom>
+              </p:spPr>
+            </p:pic>
+            <p:pic>
+              <p:nvPicPr>
+                <p:cNvPr id="135" name="Graphic 134" descr="Binary outline">
+                  <a:extLst>
+                    <a:ext uri="{FF2B5EF4-FFF2-40B4-BE49-F238E27FC236}">
+                      <a16:creationId xmlns:a16="http://schemas.microsoft.com/office/drawing/2014/main" id="{594361A7-6E7B-F2E0-1D71-C6B8848D1CB7}"/>
+                    </a:ext>
+                  </a:extLst>
+                </p:cNvPr>
+                <p:cNvPicPr>
+                  <a:picLocks noChangeAspect="1"/>
+                </p:cNvPicPr>
+                <p:nvPr/>
+              </p:nvPicPr>
+              <p:blipFill>
+                <a:blip r:embed="rId19">
+                  <a:extLst>
+                    <a:ext uri="{28A0092B-C50C-407E-A947-70E740481C1C}">
+                      <a14:useLocalDpi xmlns:a14="http://schemas.microsoft.com/office/drawing/2010/main" val="0"/>
+                    </a:ext>
+                    <a:ext uri="{96DAC541-7B7A-43D3-8B79-37D633B846F1}">
+                      <asvg:svgBlip xmlns:asvg="http://schemas.microsoft.com/office/drawing/2016/SVG/main" r:embed="rId20"/>
+                    </a:ext>
+                  </a:extLst>
+                </a:blip>
+                <a:stretch>
+                  <a:fillRect/>
+                </a:stretch>
+              </p:blipFill>
+              <p:spPr>
+                <a:xfrm>
+                  <a:off x="13472393" y="2504166"/>
+                  <a:ext cx="505734" cy="505734"/>
+                </a:xfrm>
+                <a:prstGeom prst="rect">
+                  <a:avLst/>
+                </a:prstGeom>
+              </p:spPr>
+            </p:pic>
+          </p:grpSp>
+        </p:grpSp>
         <p:pic>
           <p:nvPicPr>
-            <p:cNvPr id="77" name="Graphic 76" descr="Nerve outline">
+            <p:cNvPr id="143" name="Graphic 142" descr="Beaker outline">
               <a:extLst>
                 <a:ext uri="{FF2B5EF4-FFF2-40B4-BE49-F238E27FC236}">
-                  <a16:creationId xmlns:a16="http://schemas.microsoft.com/office/drawing/2014/main" id="{94F95C18-56BC-9B3A-8B6A-EEB8979FCB03}"/>
+                  <a16:creationId xmlns:a16="http://schemas.microsoft.com/office/drawing/2014/main" id="{D53353BC-ED21-5086-D127-D69099A4150D}"/>
                 </a:ext>
               </a:extLst>
             </p:cNvPr>
@@ -29517,13 +30285,13 @@
             <p:nvPr/>
           </p:nvPicPr>
           <p:blipFill>
-            <a:blip r:embed="rId7">
+            <a:blip r:embed="rId21">
               <a:extLst>
                 <a:ext uri="{28A0092B-C50C-407E-A947-70E740481C1C}">
                   <a14:useLocalDpi xmlns:a14="http://schemas.microsoft.com/office/drawing/2010/main" val="0"/>
                 </a:ext>
                 <a:ext uri="{96DAC541-7B7A-43D3-8B79-37D633B846F1}">
-                  <asvg:svgBlip xmlns:asvg="http://schemas.microsoft.com/office/drawing/2016/SVG/main" r:embed="rId8"/>
+                  <asvg:svgBlip xmlns:asvg="http://schemas.microsoft.com/office/drawing/2016/SVG/main" r:embed="rId22"/>
                 </a:ext>
               </a:extLst>
             </a:blip>
@@ -29532,799 +30300,16 @@
             </a:stretch>
           </p:blipFill>
           <p:spPr>
-            <a:xfrm rot="14023820">
-              <a:off x="14842030" y="4101327"/>
-              <a:ext cx="1264893" cy="1264893"/>
+            <a:xfrm rot="1325952">
+              <a:off x="15482584" y="2947684"/>
+              <a:ext cx="914400" cy="914400"/>
             </a:xfrm>
             <a:prstGeom prst="rect">
               <a:avLst/>
             </a:prstGeom>
           </p:spPr>
         </p:pic>
-        <p:pic>
-          <p:nvPicPr>
-            <p:cNvPr id="79" name="Graphic 78" descr="Petri Dish outline">
-              <a:extLst>
-                <a:ext uri="{FF2B5EF4-FFF2-40B4-BE49-F238E27FC236}">
-                  <a16:creationId xmlns:a16="http://schemas.microsoft.com/office/drawing/2014/main" id="{1B21C7D8-A71A-F622-C371-1DD4CBB6F6F6}"/>
-                </a:ext>
-              </a:extLst>
-            </p:cNvPr>
-            <p:cNvPicPr>
-              <a:picLocks noChangeAspect="1"/>
-            </p:cNvPicPr>
-            <p:nvPr/>
-          </p:nvPicPr>
-          <p:blipFill>
-            <a:blip r:embed="rId9">
-              <a:extLst>
-                <a:ext uri="{28A0092B-C50C-407E-A947-70E740481C1C}">
-                  <a14:useLocalDpi xmlns:a14="http://schemas.microsoft.com/office/drawing/2010/main" val="0"/>
-                </a:ext>
-                <a:ext uri="{96DAC541-7B7A-43D3-8B79-37D633B846F1}">
-                  <asvg:svgBlip xmlns:asvg="http://schemas.microsoft.com/office/drawing/2016/SVG/main" r:embed="rId10"/>
-                </a:ext>
-              </a:extLst>
-            </a:blip>
-            <a:stretch>
-              <a:fillRect/>
-            </a:stretch>
-          </p:blipFill>
-          <p:spPr>
-            <a:xfrm>
-              <a:off x="15012602" y="5170591"/>
-              <a:ext cx="962120" cy="962120"/>
-            </a:xfrm>
-            <a:prstGeom prst="rect">
-              <a:avLst/>
-            </a:prstGeom>
-          </p:spPr>
-        </p:pic>
-        <p:pic>
-          <p:nvPicPr>
-            <p:cNvPr id="81" name="Graphic 80" descr="Atom outline">
-              <a:extLst>
-                <a:ext uri="{FF2B5EF4-FFF2-40B4-BE49-F238E27FC236}">
-                  <a16:creationId xmlns:a16="http://schemas.microsoft.com/office/drawing/2014/main" id="{06C19A85-E002-FC2D-F19D-B1BCFB84D586}"/>
-                </a:ext>
-              </a:extLst>
-            </p:cNvPr>
-            <p:cNvPicPr>
-              <a:picLocks noChangeAspect="1"/>
-            </p:cNvPicPr>
-            <p:nvPr/>
-          </p:nvPicPr>
-          <p:blipFill>
-            <a:blip r:embed="rId11">
-              <a:extLst>
-                <a:ext uri="{28A0092B-C50C-407E-A947-70E740481C1C}">
-                  <a14:useLocalDpi xmlns:a14="http://schemas.microsoft.com/office/drawing/2010/main" val="0"/>
-                </a:ext>
-                <a:ext uri="{96DAC541-7B7A-43D3-8B79-37D633B846F1}">
-                  <asvg:svgBlip xmlns:asvg="http://schemas.microsoft.com/office/drawing/2016/SVG/main" r:embed="rId12"/>
-                </a:ext>
-              </a:extLst>
-            </a:blip>
-            <a:stretch>
-              <a:fillRect/>
-            </a:stretch>
-          </p:blipFill>
-          <p:spPr>
-            <a:xfrm>
-              <a:off x="13639800" y="3571919"/>
-              <a:ext cx="962120" cy="962120"/>
-            </a:xfrm>
-            <a:prstGeom prst="rect">
-              <a:avLst/>
-            </a:prstGeom>
-          </p:spPr>
-        </p:pic>
-        <p:pic>
-          <p:nvPicPr>
-            <p:cNvPr id="83" name="Graphic 82" descr="Tooth outline">
-              <a:extLst>
-                <a:ext uri="{FF2B5EF4-FFF2-40B4-BE49-F238E27FC236}">
-                  <a16:creationId xmlns:a16="http://schemas.microsoft.com/office/drawing/2014/main" id="{ABA54CD3-28D5-CA4B-16B7-09ABE8095ADB}"/>
-                </a:ext>
-              </a:extLst>
-            </p:cNvPr>
-            <p:cNvPicPr>
-              <a:picLocks noChangeAspect="1"/>
-            </p:cNvPicPr>
-            <p:nvPr/>
-          </p:nvPicPr>
-          <p:blipFill>
-            <a:blip r:embed="rId13">
-              <a:extLst>
-                <a:ext uri="{28A0092B-C50C-407E-A947-70E740481C1C}">
-                  <a14:useLocalDpi xmlns:a14="http://schemas.microsoft.com/office/drawing/2010/main" val="0"/>
-                </a:ext>
-                <a:ext uri="{96DAC541-7B7A-43D3-8B79-37D633B846F1}">
-                  <asvg:svgBlip xmlns:asvg="http://schemas.microsoft.com/office/drawing/2016/SVG/main" r:embed="rId14"/>
-                </a:ext>
-              </a:extLst>
-            </a:blip>
-            <a:stretch>
-              <a:fillRect/>
-            </a:stretch>
-          </p:blipFill>
-          <p:spPr>
-            <a:xfrm rot="905948">
-              <a:off x="13573820" y="5364291"/>
-              <a:ext cx="850705" cy="850705"/>
-            </a:xfrm>
-            <a:prstGeom prst="rect">
-              <a:avLst/>
-            </a:prstGeom>
-          </p:spPr>
-        </p:pic>
-        <p:pic>
-          <p:nvPicPr>
-            <p:cNvPr id="89" name="Graphic 88" descr="Heart organ outline">
-              <a:extLst>
-                <a:ext uri="{FF2B5EF4-FFF2-40B4-BE49-F238E27FC236}">
-                  <a16:creationId xmlns:a16="http://schemas.microsoft.com/office/drawing/2014/main" id="{EA74EE58-6153-AA25-EC7B-1A8627F5D5CB}"/>
-                </a:ext>
-              </a:extLst>
-            </p:cNvPr>
-            <p:cNvPicPr>
-              <a:picLocks noChangeAspect="1"/>
-            </p:cNvPicPr>
-            <p:nvPr/>
-          </p:nvPicPr>
-          <p:blipFill>
-            <a:blip r:embed="rId15">
-              <a:extLst>
-                <a:ext uri="{28A0092B-C50C-407E-A947-70E740481C1C}">
-                  <a14:useLocalDpi xmlns:a14="http://schemas.microsoft.com/office/drawing/2010/main" val="0"/>
-                </a:ext>
-                <a:ext uri="{96DAC541-7B7A-43D3-8B79-37D633B846F1}">
-                  <asvg:svgBlip xmlns:asvg="http://schemas.microsoft.com/office/drawing/2016/SVG/main" r:embed="rId16"/>
-                </a:ext>
-              </a:extLst>
-            </a:blip>
-            <a:stretch>
-              <a:fillRect/>
-            </a:stretch>
-          </p:blipFill>
-          <p:spPr>
-            <a:xfrm>
-              <a:off x="12884793" y="4977370"/>
-              <a:ext cx="907407" cy="907407"/>
-            </a:xfrm>
-            <a:prstGeom prst="rect">
-              <a:avLst/>
-            </a:prstGeom>
-          </p:spPr>
-        </p:pic>
-        <p:pic>
-          <p:nvPicPr>
-            <p:cNvPr id="91" name="Graphic 90" descr="Kidneys outline">
-              <a:extLst>
-                <a:ext uri="{FF2B5EF4-FFF2-40B4-BE49-F238E27FC236}">
-                  <a16:creationId xmlns:a16="http://schemas.microsoft.com/office/drawing/2014/main" id="{CB027AD1-2E9A-CA90-7111-FBDE0F4C7011}"/>
-                </a:ext>
-              </a:extLst>
-            </p:cNvPr>
-            <p:cNvPicPr>
-              <a:picLocks noChangeAspect="1"/>
-            </p:cNvPicPr>
-            <p:nvPr/>
-          </p:nvPicPr>
-          <p:blipFill>
-            <a:blip r:embed="rId17">
-              <a:extLst>
-                <a:ext uri="{28A0092B-C50C-407E-A947-70E740481C1C}">
-                  <a14:useLocalDpi xmlns:a14="http://schemas.microsoft.com/office/drawing/2010/main" val="0"/>
-                </a:ext>
-                <a:ext uri="{96DAC541-7B7A-43D3-8B79-37D633B846F1}">
-                  <asvg:svgBlip xmlns:asvg="http://schemas.microsoft.com/office/drawing/2016/SVG/main" r:embed="rId18"/>
-                </a:ext>
-              </a:extLst>
-            </a:blip>
-            <a:stretch>
-              <a:fillRect/>
-            </a:stretch>
-          </p:blipFill>
-          <p:spPr>
-            <a:xfrm rot="20507731">
-              <a:off x="13620963" y="4542990"/>
-              <a:ext cx="853137" cy="853137"/>
-            </a:xfrm>
-            <a:prstGeom prst="rect">
-              <a:avLst/>
-            </a:prstGeom>
-          </p:spPr>
-        </p:pic>
-        <p:grpSp>
-          <p:nvGrpSpPr>
-            <p:cNvPr id="127" name="Group 126">
-              <a:extLst>
-                <a:ext uri="{FF2B5EF4-FFF2-40B4-BE49-F238E27FC236}">
-                  <a16:creationId xmlns:a16="http://schemas.microsoft.com/office/drawing/2014/main" id="{5BFB37AF-A2F8-9FF9-876D-0F97E68FC60A}"/>
-                </a:ext>
-              </a:extLst>
-            </p:cNvPr>
-            <p:cNvGrpSpPr/>
-            <p:nvPr/>
-          </p:nvGrpSpPr>
-          <p:grpSpPr>
-            <a:xfrm>
-              <a:off x="13412331" y="6247347"/>
-              <a:ext cx="2646022" cy="3049053"/>
-              <a:chOff x="14094585" y="6970076"/>
-              <a:chExt cx="2219802" cy="2438597"/>
-            </a:xfrm>
-          </p:grpSpPr>
-          <p:sp>
-            <p:nvSpPr>
-              <p:cNvPr id="57" name="Shape">
-                <a:extLst>
-                  <a:ext uri="{FF2B5EF4-FFF2-40B4-BE49-F238E27FC236}">
-                    <a16:creationId xmlns:a16="http://schemas.microsoft.com/office/drawing/2014/main" id="{815B5E53-E17E-5827-E3E9-92EA6CBC973A}"/>
-                  </a:ext>
-                </a:extLst>
-              </p:cNvPr>
-              <p:cNvSpPr/>
-              <p:nvPr/>
-            </p:nvSpPr>
-            <p:spPr>
-              <a:xfrm>
-                <a:off x="14094585" y="6970076"/>
-                <a:ext cx="2219802" cy="2438597"/>
-              </a:xfrm>
-              <a:custGeom>
-                <a:avLst/>
-                <a:gdLst/>
-                <a:ahLst/>
-                <a:cxnLst>
-                  <a:cxn ang="0">
-                    <a:pos x="wd2" y="hd2"/>
-                  </a:cxn>
-                  <a:cxn ang="5400000">
-                    <a:pos x="wd2" y="hd2"/>
-                  </a:cxn>
-                  <a:cxn ang="10800000">
-                    <a:pos x="wd2" y="hd2"/>
-                  </a:cxn>
-                  <a:cxn ang="16200000">
-                    <a:pos x="wd2" y="hd2"/>
-                  </a:cxn>
-                </a:cxnLst>
-                <a:rect l="0" t="0" r="r" b="b"/>
-                <a:pathLst>
-                  <a:path w="21600" h="21600" extrusionOk="0">
-                    <a:moveTo>
-                      <a:pt x="21093" y="2752"/>
-                    </a:moveTo>
-                    <a:cubicBezTo>
-                      <a:pt x="20687" y="2285"/>
-                      <a:pt x="18406" y="467"/>
-                      <a:pt x="17949" y="467"/>
-                    </a:cubicBezTo>
-                    <a:cubicBezTo>
-                      <a:pt x="17949" y="0"/>
-                      <a:pt x="17087" y="0"/>
-                      <a:pt x="16631" y="0"/>
-                    </a:cubicBezTo>
-                    <a:cubicBezTo>
-                      <a:pt x="4513" y="0"/>
-                      <a:pt x="4513" y="0"/>
-                      <a:pt x="4513" y="0"/>
-                    </a:cubicBezTo>
-                    <a:cubicBezTo>
-                      <a:pt x="4513" y="0"/>
-                      <a:pt x="3651" y="0"/>
-                      <a:pt x="3144" y="467"/>
-                    </a:cubicBezTo>
-                    <a:cubicBezTo>
-                      <a:pt x="3144" y="467"/>
-                      <a:pt x="913" y="2285"/>
-                      <a:pt x="456" y="2752"/>
-                    </a:cubicBezTo>
-                    <a:cubicBezTo>
-                      <a:pt x="0" y="2752"/>
-                      <a:pt x="0" y="3219"/>
-                      <a:pt x="0" y="4154"/>
-                    </a:cubicBezTo>
-                    <a:cubicBezTo>
-                      <a:pt x="0" y="4569"/>
-                      <a:pt x="2231" y="20717"/>
-                      <a:pt x="2231" y="20717"/>
-                    </a:cubicBezTo>
-                    <a:cubicBezTo>
-                      <a:pt x="2687" y="21133"/>
-                      <a:pt x="3144" y="21600"/>
-                      <a:pt x="3651" y="21600"/>
-                    </a:cubicBezTo>
-                    <a:cubicBezTo>
-                      <a:pt x="17949" y="21600"/>
-                      <a:pt x="17949" y="21600"/>
-                      <a:pt x="17949" y="21600"/>
-                    </a:cubicBezTo>
-                    <a:cubicBezTo>
-                      <a:pt x="18406" y="21600"/>
-                      <a:pt x="18862" y="21133"/>
-                      <a:pt x="19318" y="20717"/>
-                    </a:cubicBezTo>
-                    <a:cubicBezTo>
-                      <a:pt x="19318" y="20717"/>
-                      <a:pt x="21600" y="4569"/>
-                      <a:pt x="21600" y="4154"/>
-                    </a:cubicBezTo>
-                    <a:cubicBezTo>
-                      <a:pt x="21600" y="3219"/>
-                      <a:pt x="21093" y="2752"/>
-                      <a:pt x="21093" y="2752"/>
-                    </a:cubicBezTo>
-                    <a:close/>
-                    <a:moveTo>
-                      <a:pt x="10800" y="13812"/>
-                    </a:moveTo>
-                    <a:cubicBezTo>
-                      <a:pt x="6744" y="13812"/>
-                      <a:pt x="5882" y="7788"/>
-                      <a:pt x="5425" y="6438"/>
-                    </a:cubicBezTo>
-                    <a:cubicBezTo>
-                      <a:pt x="8113" y="6438"/>
-                      <a:pt x="8113" y="6438"/>
-                      <a:pt x="8113" y="6438"/>
-                    </a:cubicBezTo>
-                    <a:cubicBezTo>
-                      <a:pt x="8113" y="8256"/>
-                      <a:pt x="9025" y="11527"/>
-                      <a:pt x="10800" y="11527"/>
-                    </a:cubicBezTo>
-                    <a:cubicBezTo>
-                      <a:pt x="12575" y="11527"/>
-                      <a:pt x="13031" y="8256"/>
-                      <a:pt x="13487" y="6438"/>
-                    </a:cubicBezTo>
-                    <a:cubicBezTo>
-                      <a:pt x="15718" y="6438"/>
-                      <a:pt x="15718" y="6438"/>
-                      <a:pt x="15718" y="6438"/>
-                    </a:cubicBezTo>
-                    <a:cubicBezTo>
-                      <a:pt x="15718" y="7788"/>
-                      <a:pt x="14856" y="13812"/>
-                      <a:pt x="10800" y="13812"/>
-                    </a:cubicBezTo>
-                    <a:close/>
-                    <a:moveTo>
-                      <a:pt x="1825" y="4154"/>
-                    </a:moveTo>
-                    <a:cubicBezTo>
-                      <a:pt x="4513" y="1402"/>
-                      <a:pt x="4513" y="1402"/>
-                      <a:pt x="4513" y="1402"/>
-                    </a:cubicBezTo>
-                    <a:cubicBezTo>
-                      <a:pt x="16631" y="1402"/>
-                      <a:pt x="16631" y="1402"/>
-                      <a:pt x="16631" y="1402"/>
-                    </a:cubicBezTo>
-                    <a:cubicBezTo>
-                      <a:pt x="19825" y="4154"/>
-                      <a:pt x="19825" y="4154"/>
-                      <a:pt x="19825" y="4154"/>
-                    </a:cubicBezTo>
-                    <a:lnTo>
-                      <a:pt x="1825" y="4154"/>
-                    </a:lnTo>
-                    <a:close/>
-                  </a:path>
-                </a:pathLst>
-              </a:custGeom>
-              <a:solidFill>
-                <a:srgbClr val="8EB4E3"/>
-              </a:solidFill>
-              <a:ln w="12700">
-                <a:noFill/>
-                <a:miter lim="400000"/>
-              </a:ln>
-            </p:spPr>
-            <p:txBody>
-              <a:bodyPr lIns="121919" tIns="121919" rIns="121919" bIns="121919" anchor="ctr"/>
-              <a:lstStyle/>
-              <a:p>
-                <a:endParaRPr/>
-              </a:p>
-            </p:txBody>
-          </p:sp>
-          <p:sp>
-            <p:nvSpPr>
-              <p:cNvPr id="126" name="Rectangle 125">
-                <a:extLst>
-                  <a:ext uri="{FF2B5EF4-FFF2-40B4-BE49-F238E27FC236}">
-                    <a16:creationId xmlns:a16="http://schemas.microsoft.com/office/drawing/2014/main" id="{D7171D63-93D7-E890-0B1E-9E1E050E8F65}"/>
-                  </a:ext>
-                </a:extLst>
-              </p:cNvPr>
-              <p:cNvSpPr/>
-              <p:nvPr/>
-            </p:nvSpPr>
-            <p:spPr>
-              <a:xfrm>
-                <a:off x="14554843" y="7633330"/>
-                <a:ext cx="1343025" cy="1037511"/>
-              </a:xfrm>
-              <a:prstGeom prst="rect">
-                <a:avLst/>
-              </a:prstGeom>
-              <a:solidFill>
-                <a:srgbClr val="8EB4E3"/>
-              </a:solidFill>
-              <a:ln>
-                <a:noFill/>
-              </a:ln>
-            </p:spPr>
-            <p:style>
-              <a:lnRef idx="2">
-                <a:schemeClr val="accent1">
-                  <a:shade val="50000"/>
-                </a:schemeClr>
-              </a:lnRef>
-              <a:fillRef idx="1">
-                <a:schemeClr val="accent1"/>
-              </a:fillRef>
-              <a:effectRef idx="0">
-                <a:schemeClr val="accent1"/>
-              </a:effectRef>
-              <a:fontRef idx="minor">
-                <a:schemeClr val="lt1"/>
-              </a:fontRef>
-            </p:style>
-            <p:txBody>
-              <a:bodyPr rtlCol="0" anchor="ctr"/>
-              <a:lstStyle/>
-              <a:p>
-                <a:pPr algn="ctr"/>
-                <a:endParaRPr lang="en-DK"/>
-              </a:p>
-            </p:txBody>
-          </p:sp>
-        </p:grpSp>
-        <p:cxnSp>
-          <p:nvCxnSpPr>
-            <p:cNvPr id="128" name="Straight Connector 127">
-              <a:extLst>
-                <a:ext uri="{FF2B5EF4-FFF2-40B4-BE49-F238E27FC236}">
-                  <a16:creationId xmlns:a16="http://schemas.microsoft.com/office/drawing/2014/main" id="{DF6C8A1E-00C8-FCB8-1C95-807CA7DE9751}"/>
-                </a:ext>
-              </a:extLst>
-            </p:cNvPr>
-            <p:cNvCxnSpPr>
-              <a:cxnSpLocks/>
-            </p:cNvCxnSpPr>
-            <p:nvPr/>
-          </p:nvCxnSpPr>
-          <p:spPr>
-            <a:xfrm flipV="1">
-              <a:off x="14775688" y="5170591"/>
-              <a:ext cx="0" cy="1518908"/>
-            </a:xfrm>
-            <a:prstGeom prst="line">
-              <a:avLst/>
-            </a:prstGeom>
-            <a:ln w="53975">
-              <a:solidFill>
-                <a:srgbClr val="404040"/>
-              </a:solidFill>
-              <a:headEnd type="arrow"/>
-            </a:ln>
-          </p:spPr>
-          <p:style>
-            <a:lnRef idx="1">
-              <a:schemeClr val="accent1"/>
-            </a:lnRef>
-            <a:fillRef idx="0">
-              <a:schemeClr val="accent1"/>
-            </a:fillRef>
-            <a:effectRef idx="0">
-              <a:schemeClr val="accent1"/>
-            </a:effectRef>
-            <a:fontRef idx="minor">
-              <a:schemeClr val="tx1"/>
-            </a:fontRef>
-          </p:style>
-        </p:cxnSp>
-        <p:grpSp>
-          <p:nvGrpSpPr>
-            <p:cNvPr id="129" name="Group 128">
-              <a:extLst>
-                <a:ext uri="{FF2B5EF4-FFF2-40B4-BE49-F238E27FC236}">
-                  <a16:creationId xmlns:a16="http://schemas.microsoft.com/office/drawing/2014/main" id="{F172C642-12CC-BE0F-C5E4-EA4B2F5D0A4D}"/>
-                </a:ext>
-              </a:extLst>
-            </p:cNvPr>
-            <p:cNvGrpSpPr/>
-            <p:nvPr/>
-          </p:nvGrpSpPr>
-          <p:grpSpPr>
-            <a:xfrm>
-              <a:off x="13735578" y="7173074"/>
-              <a:ext cx="2074288" cy="1623823"/>
-              <a:chOff x="12649200" y="2046966"/>
-              <a:chExt cx="1328927" cy="962934"/>
-            </a:xfrm>
-          </p:grpSpPr>
-          <p:pic>
-            <p:nvPicPr>
-              <p:cNvPr id="130" name="Graphic 129" descr="Binary outline">
-                <a:extLst>
-                  <a:ext uri="{FF2B5EF4-FFF2-40B4-BE49-F238E27FC236}">
-                    <a16:creationId xmlns:a16="http://schemas.microsoft.com/office/drawing/2014/main" id="{EB7020B5-B836-1B55-284C-CDD70A322FBD}"/>
-                  </a:ext>
-                </a:extLst>
-              </p:cNvPr>
-              <p:cNvPicPr>
-                <a:picLocks noChangeAspect="1"/>
-              </p:cNvPicPr>
-              <p:nvPr/>
-            </p:nvPicPr>
-            <p:blipFill>
-              <a:blip r:embed="rId19">
-                <a:extLst>
-                  <a:ext uri="{28A0092B-C50C-407E-A947-70E740481C1C}">
-                    <a14:useLocalDpi xmlns:a14="http://schemas.microsoft.com/office/drawing/2010/main" val="0"/>
-                  </a:ext>
-                  <a:ext uri="{96DAC541-7B7A-43D3-8B79-37D633B846F1}">
-                    <asvg:svgBlip xmlns:asvg="http://schemas.microsoft.com/office/drawing/2016/SVG/main" r:embed="rId20"/>
-                  </a:ext>
-                </a:extLst>
-              </a:blip>
-              <a:stretch>
-                <a:fillRect/>
-              </a:stretch>
-            </p:blipFill>
-            <p:spPr>
-              <a:xfrm>
-                <a:off x="12649200" y="2046966"/>
-                <a:ext cx="505734" cy="505734"/>
-              </a:xfrm>
-              <a:prstGeom prst="rect">
-                <a:avLst/>
-              </a:prstGeom>
-            </p:spPr>
-          </p:pic>
-          <p:pic>
-            <p:nvPicPr>
-              <p:cNvPr id="131" name="Graphic 130" descr="Binary outline">
-                <a:extLst>
-                  <a:ext uri="{FF2B5EF4-FFF2-40B4-BE49-F238E27FC236}">
-                    <a16:creationId xmlns:a16="http://schemas.microsoft.com/office/drawing/2014/main" id="{3D33BB2A-62AA-78BF-27A7-BFD4F3FF276B}"/>
-                  </a:ext>
-                </a:extLst>
-              </p:cNvPr>
-              <p:cNvPicPr>
-                <a:picLocks noChangeAspect="1"/>
-              </p:cNvPicPr>
-              <p:nvPr/>
-            </p:nvPicPr>
-            <p:blipFill>
-              <a:blip r:embed="rId19">
-                <a:extLst>
-                  <a:ext uri="{28A0092B-C50C-407E-A947-70E740481C1C}">
-                    <a14:useLocalDpi xmlns:a14="http://schemas.microsoft.com/office/drawing/2010/main" val="0"/>
-                  </a:ext>
-                  <a:ext uri="{96DAC541-7B7A-43D3-8B79-37D633B846F1}">
-                    <asvg:svgBlip xmlns:asvg="http://schemas.microsoft.com/office/drawing/2016/SVG/main" r:embed="rId20"/>
-                  </a:ext>
-                </a:extLst>
-              </a:blip>
-              <a:stretch>
-                <a:fillRect/>
-              </a:stretch>
-            </p:blipFill>
-            <p:spPr>
-              <a:xfrm>
-                <a:off x="13057866" y="2046966"/>
-                <a:ext cx="505734" cy="505734"/>
-              </a:xfrm>
-              <a:prstGeom prst="rect">
-                <a:avLst/>
-              </a:prstGeom>
-            </p:spPr>
-          </p:pic>
-          <p:pic>
-            <p:nvPicPr>
-              <p:cNvPr id="132" name="Graphic 131" descr="Binary outline">
-                <a:extLst>
-                  <a:ext uri="{FF2B5EF4-FFF2-40B4-BE49-F238E27FC236}">
-                    <a16:creationId xmlns:a16="http://schemas.microsoft.com/office/drawing/2014/main" id="{69599159-B020-7730-31A9-738EF212A543}"/>
-                  </a:ext>
-                </a:extLst>
-              </p:cNvPr>
-              <p:cNvPicPr>
-                <a:picLocks noChangeAspect="1"/>
-              </p:cNvPicPr>
-              <p:nvPr/>
-            </p:nvPicPr>
-            <p:blipFill>
-              <a:blip r:embed="rId19">
-                <a:extLst>
-                  <a:ext uri="{28A0092B-C50C-407E-A947-70E740481C1C}">
-                    <a14:useLocalDpi xmlns:a14="http://schemas.microsoft.com/office/drawing/2010/main" val="0"/>
-                  </a:ext>
-                  <a:ext uri="{96DAC541-7B7A-43D3-8B79-37D633B846F1}">
-                    <asvg:svgBlip xmlns:asvg="http://schemas.microsoft.com/office/drawing/2016/SVG/main" r:embed="rId20"/>
-                  </a:ext>
-                </a:extLst>
-              </a:blip>
-              <a:stretch>
-                <a:fillRect/>
-              </a:stretch>
-            </p:blipFill>
-            <p:spPr>
-              <a:xfrm>
-                <a:off x="12649200" y="2504166"/>
-                <a:ext cx="505734" cy="505734"/>
-              </a:xfrm>
-              <a:prstGeom prst="rect">
-                <a:avLst/>
-              </a:prstGeom>
-            </p:spPr>
-          </p:pic>
-          <p:pic>
-            <p:nvPicPr>
-              <p:cNvPr id="133" name="Graphic 132" descr="Binary outline">
-                <a:extLst>
-                  <a:ext uri="{FF2B5EF4-FFF2-40B4-BE49-F238E27FC236}">
-                    <a16:creationId xmlns:a16="http://schemas.microsoft.com/office/drawing/2014/main" id="{7214BDC9-0B9B-E4D0-4E74-DEB6473CA4CC}"/>
-                  </a:ext>
-                </a:extLst>
-              </p:cNvPr>
-              <p:cNvPicPr>
-                <a:picLocks noChangeAspect="1"/>
-              </p:cNvPicPr>
-              <p:nvPr/>
-            </p:nvPicPr>
-            <p:blipFill>
-              <a:blip r:embed="rId19">
-                <a:extLst>
-                  <a:ext uri="{28A0092B-C50C-407E-A947-70E740481C1C}">
-                    <a14:useLocalDpi xmlns:a14="http://schemas.microsoft.com/office/drawing/2010/main" val="0"/>
-                  </a:ext>
-                  <a:ext uri="{96DAC541-7B7A-43D3-8B79-37D633B846F1}">
-                    <asvg:svgBlip xmlns:asvg="http://schemas.microsoft.com/office/drawing/2016/SVG/main" r:embed="rId20"/>
-                  </a:ext>
-                </a:extLst>
-              </a:blip>
-              <a:stretch>
-                <a:fillRect/>
-              </a:stretch>
-            </p:blipFill>
-            <p:spPr>
-              <a:xfrm>
-                <a:off x="13057866" y="2504166"/>
-                <a:ext cx="505734" cy="505734"/>
-              </a:xfrm>
-              <a:prstGeom prst="rect">
-                <a:avLst/>
-              </a:prstGeom>
-            </p:spPr>
-          </p:pic>
-          <p:pic>
-            <p:nvPicPr>
-              <p:cNvPr id="134" name="Graphic 133" descr="Binary outline">
-                <a:extLst>
-                  <a:ext uri="{FF2B5EF4-FFF2-40B4-BE49-F238E27FC236}">
-                    <a16:creationId xmlns:a16="http://schemas.microsoft.com/office/drawing/2014/main" id="{C992B9DF-EA9F-3CB5-FF16-CE7926DF5021}"/>
-                  </a:ext>
-                </a:extLst>
-              </p:cNvPr>
-              <p:cNvPicPr>
-                <a:picLocks noChangeAspect="1"/>
-              </p:cNvPicPr>
-              <p:nvPr/>
-            </p:nvPicPr>
-            <p:blipFill>
-              <a:blip r:embed="rId19">
-                <a:extLst>
-                  <a:ext uri="{28A0092B-C50C-407E-A947-70E740481C1C}">
-                    <a14:useLocalDpi xmlns:a14="http://schemas.microsoft.com/office/drawing/2010/main" val="0"/>
-                  </a:ext>
-                  <a:ext uri="{96DAC541-7B7A-43D3-8B79-37D633B846F1}">
-                    <asvg:svgBlip xmlns:asvg="http://schemas.microsoft.com/office/drawing/2016/SVG/main" r:embed="rId20"/>
-                  </a:ext>
-                </a:extLst>
-              </a:blip>
-              <a:stretch>
-                <a:fillRect/>
-              </a:stretch>
-            </p:blipFill>
-            <p:spPr>
-              <a:xfrm>
-                <a:off x="13472393" y="2046966"/>
-                <a:ext cx="505734" cy="505734"/>
-              </a:xfrm>
-              <a:prstGeom prst="rect">
-                <a:avLst/>
-              </a:prstGeom>
-            </p:spPr>
-          </p:pic>
-          <p:pic>
-            <p:nvPicPr>
-              <p:cNvPr id="135" name="Graphic 134" descr="Binary outline">
-                <a:extLst>
-                  <a:ext uri="{FF2B5EF4-FFF2-40B4-BE49-F238E27FC236}">
-                    <a16:creationId xmlns:a16="http://schemas.microsoft.com/office/drawing/2014/main" id="{594361A7-6E7B-F2E0-1D71-C6B8848D1CB7}"/>
-                  </a:ext>
-                </a:extLst>
-              </p:cNvPr>
-              <p:cNvPicPr>
-                <a:picLocks noChangeAspect="1"/>
-              </p:cNvPicPr>
-              <p:nvPr/>
-            </p:nvPicPr>
-            <p:blipFill>
-              <a:blip r:embed="rId19">
-                <a:extLst>
-                  <a:ext uri="{28A0092B-C50C-407E-A947-70E740481C1C}">
-                    <a14:useLocalDpi xmlns:a14="http://schemas.microsoft.com/office/drawing/2010/main" val="0"/>
-                  </a:ext>
-                  <a:ext uri="{96DAC541-7B7A-43D3-8B79-37D633B846F1}">
-                    <asvg:svgBlip xmlns:asvg="http://schemas.microsoft.com/office/drawing/2016/SVG/main" r:embed="rId20"/>
-                  </a:ext>
-                </a:extLst>
-              </a:blip>
-              <a:stretch>
-                <a:fillRect/>
-              </a:stretch>
-            </p:blipFill>
-            <p:spPr>
-              <a:xfrm>
-                <a:off x="13472393" y="2504166"/>
-                <a:ext cx="505734" cy="505734"/>
-              </a:xfrm>
-              <a:prstGeom prst="rect">
-                <a:avLst/>
-              </a:prstGeom>
-            </p:spPr>
-          </p:pic>
-        </p:grpSp>
       </p:grpSp>
-      <p:pic>
-        <p:nvPicPr>
-          <p:cNvPr id="143" name="Graphic 142" descr="Beaker outline">
-            <a:extLst>
-              <a:ext uri="{FF2B5EF4-FFF2-40B4-BE49-F238E27FC236}">
-                <a16:creationId xmlns:a16="http://schemas.microsoft.com/office/drawing/2014/main" id="{D53353BC-ED21-5086-D127-D69099A4150D}"/>
-              </a:ext>
-            </a:extLst>
-          </p:cNvPr>
-          <p:cNvPicPr>
-            <a:picLocks noChangeAspect="1"/>
-          </p:cNvPicPr>
-          <p:nvPr/>
-        </p:nvPicPr>
-        <p:blipFill>
-          <a:blip r:embed="rId21">
-            <a:extLst>
-              <a:ext uri="{28A0092B-C50C-407E-A947-70E740481C1C}">
-                <a14:useLocalDpi xmlns:a14="http://schemas.microsoft.com/office/drawing/2010/main" val="0"/>
-              </a:ext>
-              <a:ext uri="{96DAC541-7B7A-43D3-8B79-37D633B846F1}">
-                <asvg:svgBlip xmlns:asvg="http://schemas.microsoft.com/office/drawing/2016/SVG/main" r:embed="rId22"/>
-              </a:ext>
-            </a:extLst>
-          </a:blip>
-          <a:stretch>
-            <a:fillRect/>
-          </a:stretch>
-        </p:blipFill>
-        <p:spPr>
-          <a:xfrm rot="1325952">
-            <a:off x="15482584" y="2947684"/>
-            <a:ext cx="914400" cy="914400"/>
-          </a:xfrm>
-          <a:prstGeom prst="rect">
-            <a:avLst/>
-          </a:prstGeom>
-        </p:spPr>
-      </p:pic>
       <p:pic>
         <p:nvPicPr>
           <p:cNvPr id="2" name="Picture 1" descr="A blue and black logo&#10;&#10;Description automatically generated">
@@ -30565,7 +30550,7 @@
         </p:nvSpPr>
         <p:spPr>
           <a:xfrm>
-            <a:off x="1009399" y="2843959"/>
+            <a:off x="1009399" y="3120901"/>
             <a:ext cx="5635896" cy="3394199"/>
           </a:xfrm>
           <a:prstGeom prst="rect">
@@ -30626,7 +30611,7 @@
                 </a:solidFill>
                 <a:latin typeface="Montserrat" pitchFamily="2" charset="77"/>
               </a:rPr>
-              <a:t>Can usually be represented as a number or a category</a:t>
+              <a:t>Represented as a number or a category</a:t>
             </a:r>
           </a:p>
           <a:p>
@@ -30644,7 +30629,7 @@
                 </a:solidFill>
                 <a:latin typeface="Montserrat" pitchFamily="2" charset="77"/>
               </a:rPr>
-              <a:t>Typically low dimensional, but </a:t>
+              <a:t>Often low dimensional, but </a:t>
             </a:r>
             <a:r>
               <a:rPr lang="en-US" sz="2400" i="1" dirty="0">
@@ -30853,8 +30838,8 @@
         </p:nvSpPr>
         <p:spPr>
           <a:xfrm>
-            <a:off x="6408469" y="1080000"/>
-            <a:ext cx="5250532" cy="940322"/>
+            <a:off x="5026256" y="1056704"/>
+            <a:ext cx="7688531" cy="921278"/>
           </a:xfrm>
           <a:prstGeom prst="rect">
             <a:avLst/>
@@ -30881,7 +30866,7 @@
                 </a:solidFill>
                 <a:latin typeface="Montserrat" pitchFamily="2" charset="77"/>
               </a:rPr>
-              <a:t>DATA TYPES</a:t>
+              <a:t>DATA TYPES IN HDS</a:t>
             </a:r>
           </a:p>
         </p:txBody>
@@ -30911,7 +30896,7 @@
           </a:ln>
           <a:extLst>
             <a:ext uri="{C572A759-6A51-4108-AA02-DFA0A04FC94B}">
-              <ma14:wrappingTextBoxFlag xmlns="" xmlns:m="http://schemas.openxmlformats.org/officeDocument/2006/math" xmlns:a14="http://schemas.microsoft.com/office/drawing/2010/main" xmlns:ma14="http://schemas.microsoft.com/office/mac/drawingml/2011/main" val="1"/>
+              <ma14:wrappingTextBoxFlag xmlns:ma14="http://schemas.microsoft.com/office/mac/drawingml/2011/main" xmlns:a14="http://schemas.microsoft.com/office/drawing/2010/main" xmlns:m="http://schemas.openxmlformats.org/officeDocument/2006/math" xmlns="" val="1"/>
             </a:ext>
           </a:extLst>
         </p:spPr>
@@ -31375,7 +31360,7 @@
             </a:ln>
             <a:extLst>
               <a:ext uri="{C572A759-6A51-4108-AA02-DFA0A04FC94B}">
-                <ma14:wrappingTextBoxFlag xmlns="" xmlns:m="http://schemas.openxmlformats.org/officeDocument/2006/math" xmlns:a14="http://schemas.microsoft.com/office/drawing/2010/main" xmlns:ma14="http://schemas.microsoft.com/office/mac/drawingml/2011/main" val="1"/>
+                <ma14:wrappingTextBoxFlag xmlns:ma14="http://schemas.microsoft.com/office/mac/drawingml/2011/main" xmlns:a14="http://schemas.microsoft.com/office/drawing/2010/main" xmlns:m="http://schemas.openxmlformats.org/officeDocument/2006/math" xmlns="" val="1"/>
               </a:ext>
             </a:extLst>
           </p:spPr>
@@ -31437,7 +31422,7 @@
             </a:ln>
             <a:extLst>
               <a:ext uri="{C572A759-6A51-4108-AA02-DFA0A04FC94B}">
-                <ma14:wrappingTextBoxFlag xmlns="" xmlns:m="http://schemas.openxmlformats.org/officeDocument/2006/math" xmlns:a14="http://schemas.microsoft.com/office/drawing/2010/main" xmlns:ma14="http://schemas.microsoft.com/office/mac/drawingml/2011/main" val="1"/>
+                <ma14:wrappingTextBoxFlag xmlns:ma14="http://schemas.microsoft.com/office/mac/drawingml/2011/main" xmlns:a14="http://schemas.microsoft.com/office/drawing/2010/main" xmlns:m="http://schemas.openxmlformats.org/officeDocument/2006/math" xmlns="" val="1"/>
               </a:ext>
             </a:extLst>
           </p:spPr>
@@ -31500,7 +31485,7 @@
             </a:ln>
             <a:extLst>
               <a:ext uri="{C572A759-6A51-4108-AA02-DFA0A04FC94B}">
-                <ma14:wrappingTextBoxFlag xmlns="" xmlns:m="http://schemas.openxmlformats.org/officeDocument/2006/math" xmlns:a14="http://schemas.microsoft.com/office/drawing/2010/main" xmlns:ma14="http://schemas.microsoft.com/office/mac/drawingml/2011/main" val="1"/>
+                <ma14:wrappingTextBoxFlag xmlns:ma14="http://schemas.microsoft.com/office/mac/drawingml/2011/main" xmlns:a14="http://schemas.microsoft.com/office/drawing/2010/main" xmlns:m="http://schemas.openxmlformats.org/officeDocument/2006/math" xmlns="" val="1"/>
               </a:ext>
             </a:extLst>
           </p:spPr>
@@ -31556,7 +31541,7 @@
             </a:ln>
             <a:extLst>
               <a:ext uri="{C572A759-6A51-4108-AA02-DFA0A04FC94B}">
-                <ma14:wrappingTextBoxFlag xmlns="" xmlns:m="http://schemas.openxmlformats.org/officeDocument/2006/math" xmlns:a14="http://schemas.microsoft.com/office/drawing/2010/main" xmlns:ma14="http://schemas.microsoft.com/office/mac/drawingml/2011/main" val="1"/>
+                <ma14:wrappingTextBoxFlag xmlns:ma14="http://schemas.microsoft.com/office/mac/drawingml/2011/main" xmlns:a14="http://schemas.microsoft.com/office/drawing/2010/main" xmlns:m="http://schemas.openxmlformats.org/officeDocument/2006/math" xmlns="" val="1"/>
               </a:ext>
             </a:extLst>
           </p:spPr>
@@ -33425,7 +33410,7 @@
                 </a:solidFill>
                 <a:latin typeface="Montserrat"/>
               </a:rPr>
-              <a:t>We have many such resources in Denmark but getting access can be a cumbersome process, since this is (highly!) person-sensitive data</a:t>
+              <a:t>Great resources in Denmark but access can be a cumbersome process, as these are (highly!) person-sensitive data</a:t>
             </a:r>
           </a:p>
         </p:txBody>
@@ -33638,8 +33623,8 @@
         </p:nvSpPr>
         <p:spPr>
           <a:xfrm>
-            <a:off x="8445346" y="5677470"/>
-            <a:ext cx="8915400" cy="4016421"/>
+            <a:off x="7912225" y="6005695"/>
+            <a:ext cx="9842654" cy="3439339"/>
           </a:xfrm>
           <a:prstGeom prst="rect">
             <a:avLst/>
@@ -33665,7 +33650,7 @@
                 </a:solidFill>
                 <a:latin typeface="Montserrat"/>
               </a:rPr>
-              <a:t>Access has to be applied through the proper channels and compliance has to be ensured while working with them. </a:t>
+              <a:t>Access has to be applied for through proper channels and compliance has to be ensured while working with these data. </a:t>
             </a:r>
             <a:endParaRPr lang="en-US" sz="2800" dirty="0">
               <a:solidFill>
@@ -33694,13 +33679,22 @@
               </a:lnSpc>
             </a:pPr>
             <a:r>
+              <a:rPr lang="en-US" sz="2800" dirty="0" err="1">
+                <a:solidFill>
+                  <a:srgbClr val="404040"/>
+                </a:solidFill>
+                <a:latin typeface="Montserrat" pitchFamily="2" charset="77"/>
+              </a:rPr>
+              <a:t>HeaDS</a:t>
+            </a:r>
+            <a:r>
               <a:rPr lang="en-US" sz="2800" dirty="0">
                 <a:solidFill>
                   <a:srgbClr val="404040"/>
                 </a:solidFill>
                 <a:latin typeface="Montserrat" pitchFamily="2" charset="77"/>
               </a:rPr>
-              <a:t>You can hear more about this in our </a:t>
+              <a:t> </a:t>
             </a:r>
             <a:r>
               <a:rPr lang="en-US" sz="2800" b="1" dirty="0">
@@ -33876,8 +33870,8 @@
         </p:nvSpPr>
         <p:spPr>
           <a:xfrm>
-            <a:off x="1914052" y="3053436"/>
-            <a:ext cx="8839199" cy="6856749"/>
+            <a:off x="1914052" y="2719168"/>
+            <a:ext cx="8839199" cy="6863097"/>
           </a:xfrm>
           <a:prstGeom prst="rect">
             <a:avLst/>
@@ -33895,13 +33889,13 @@
               </a:lnSpc>
             </a:pPr>
             <a:r>
-              <a:rPr lang="en-US" sz="2400" dirty="0">
+              <a:rPr lang="en-US" sz="2600" dirty="0">
                 <a:solidFill>
                   <a:srgbClr val="404040"/>
                 </a:solidFill>
-                <a:latin typeface="Montserrat"/>
+                <a:latin typeface="Montserrat" pitchFamily="2" charset="77"/>
               </a:rPr>
-              <a:t>Most doctors, epidemiologists, …, and statisticians work with registry data (birth, death, diseases, medications, biometrics)</a:t>
+              <a:t>Most doctors, epidemiologists, …, and statisticians work with registries</a:t>
             </a:r>
           </a:p>
           <a:p>
@@ -33910,7 +33904,7 @@
                 <a:spcPts val="4480"/>
               </a:lnSpc>
             </a:pPr>
-            <a:endParaRPr lang="en-US" sz="2400" dirty="0">
+            <a:endParaRPr lang="en-US" sz="2600" dirty="0">
               <a:solidFill>
                 <a:srgbClr val="404040"/>
               </a:solidFill>
@@ -33924,7 +33918,7 @@
               </a:lnSpc>
             </a:pPr>
             <a:r>
-              <a:rPr lang="en-US" sz="2400" dirty="0">
+              <a:rPr lang="en-US" sz="2600" dirty="0">
                 <a:solidFill>
                   <a:srgbClr val="404040"/>
                 </a:solidFill>
@@ -33942,7 +33936,7 @@
               <a:buChar char="•"/>
             </a:pPr>
             <a:r>
-              <a:rPr lang="en-US" sz="2400" dirty="0">
+              <a:rPr lang="en-US" sz="2600" dirty="0">
                 <a:solidFill>
                   <a:srgbClr val="404040"/>
                 </a:solidFill>
@@ -33960,11 +33954,11 @@
               <a:buChar char="•"/>
             </a:pPr>
             <a:r>
-              <a:rPr lang="en-US" sz="2400" dirty="0">
+              <a:rPr lang="en-US" sz="2600" dirty="0">
                 <a:solidFill>
                   <a:srgbClr val="404040"/>
                 </a:solidFill>
-                <a:latin typeface="Montserrat"/>
+                <a:latin typeface="Montserrat" pitchFamily="2" charset="77"/>
               </a:rPr>
               <a:t>There are many inconsistencies and errors</a:t>
             </a:r>
@@ -33978,15 +33972,17 @@
               <a:buChar char="•"/>
             </a:pPr>
             <a:r>
-              <a:rPr lang="en-US" sz="2400" dirty="0">
+              <a:rPr lang="en-US" sz="2600" dirty="0">
                 <a:solidFill>
                   <a:srgbClr val="404040"/>
                 </a:solidFill>
-                <a:latin typeface="Montserrat"/>
+                <a:latin typeface="Montserrat" pitchFamily="2" charset="77"/>
               </a:rPr>
               <a:t>Missing data are very common</a:t>
             </a:r>
-            <a:endParaRPr lang="en-US" dirty="0"/>
+            <a:endParaRPr lang="en-US" sz="2600" dirty="0">
+              <a:latin typeface="Montserrat" pitchFamily="2" charset="77"/>
+            </a:endParaRPr>
           </a:p>
           <a:p>
             <a:pPr marL="690880" lvl="1" indent="-345440">
@@ -33997,7 +33993,7 @@
               <a:buChar char="•"/>
             </a:pPr>
             <a:r>
-              <a:rPr lang="en-US" sz="2400" dirty="0">
+              <a:rPr lang="en-US" sz="2600" dirty="0">
                 <a:solidFill>
                   <a:srgbClr val="404040"/>
                 </a:solidFill>
@@ -34014,7 +34010,7 @@
               <a:buFont typeface="Arial"/>
               <a:buChar char="•"/>
             </a:pPr>
-            <a:endParaRPr lang="en-US" sz="2400" dirty="0">
+            <a:endParaRPr lang="en-US" sz="2600" dirty="0">
               <a:solidFill>
                 <a:srgbClr val="404040"/>
               </a:solidFill>
@@ -34028,7 +34024,7 @@
               </a:lnSpc>
             </a:pPr>
             <a:r>
-              <a:rPr lang="en-US" sz="2400" dirty="0">
+              <a:rPr lang="en-US" sz="2600" dirty="0">
                 <a:solidFill>
                   <a:srgbClr val="404040"/>
                 </a:solidFill>
@@ -34037,7 +34033,7 @@
               <a:t>The registries are governed by </a:t>
             </a:r>
             <a:r>
-              <a:rPr lang="en-US" sz="2400" b="1" dirty="0" err="1">
+              <a:rPr lang="en-US" sz="2600" b="1" dirty="0" err="1">
                 <a:solidFill>
                   <a:srgbClr val="404040"/>
                 </a:solidFill>
@@ -34046,7 +34042,7 @@
               <a:t>Sundhedsdatastyrelsen</a:t>
             </a:r>
             <a:r>
-              <a:rPr lang="en-US" sz="2400" dirty="0">
+              <a:rPr lang="en-US" sz="2600" dirty="0">
                 <a:solidFill>
                   <a:srgbClr val="404040"/>
                 </a:solidFill>
@@ -34242,8 +34238,8 @@
         </p:blipFill>
         <p:spPr>
           <a:xfrm>
-            <a:off x="10972800" y="2400300"/>
-            <a:ext cx="6240853" cy="6179669"/>
+            <a:off x="10668000" y="2132999"/>
+            <a:ext cx="6934200" cy="6866219"/>
           </a:xfrm>
           <a:prstGeom prst="ellipse">
             <a:avLst/>
@@ -34264,7 +34260,7 @@
         </p:nvSpPr>
         <p:spPr>
           <a:xfrm>
-            <a:off x="12801600" y="8722219"/>
+            <a:off x="12801600" y="9182100"/>
             <a:ext cx="2667000" cy="276999"/>
           </a:xfrm>
           <a:prstGeom prst="rect">
@@ -36438,6 +36434,17 @@
 </file>
 
 <file path=customXml/item2.xml><?xml version="1.0" encoding="utf-8"?>
+<p:properties xmlns:p="http://schemas.microsoft.com/office/2006/metadata/properties" xmlns:xsi="http://www.w3.org/2001/XMLSchema-instance" xmlns:pc="http://schemas.microsoft.com/office/infopath/2007/PartnerControls">
+  <documentManagement>
+    <TaxCatchAll xmlns="c12dc4f0-a365-46b3-9e07-9aae8de5ba6f" xsi:nil="true"/>
+    <lcf76f155ced4ddcb4097134ff3c332f xmlns="b30be232-03ea-456c-8192-b7ea3ce3ddcd">
+      <Terms xmlns="http://schemas.microsoft.com/office/infopath/2007/PartnerControls"/>
+    </lcf76f155ced4ddcb4097134ff3c332f>
+  </documentManagement>
+</p:properties>
+</file>
+
+<file path=customXml/item3.xml><?xml version="1.0" encoding="utf-8"?>
 <ct:contentTypeSchema xmlns:ct="http://schemas.microsoft.com/office/2006/metadata/contentType" xmlns:ma="http://schemas.microsoft.com/office/2006/metadata/properties/metaAttributes" ct:_="" ma:_="" ma:contentTypeName="Document" ma:contentTypeID="0x010100338C0C0DDBC9B742BC44458BFD432381" ma:contentTypeVersion="16" ma:contentTypeDescription="Create a new document." ma:contentTypeScope="" ma:versionID="9e3a3b9664c02b87506af07230493c03">
   <xsd:schema xmlns:xsd="http://www.w3.org/2001/XMLSchema" xmlns:xs="http://www.w3.org/2001/XMLSchema" xmlns:p="http://schemas.microsoft.com/office/2006/metadata/properties" xmlns:ns2="b30be232-03ea-456c-8192-b7ea3ce3ddcd" xmlns:ns3="c12dc4f0-a365-46b3-9e07-9aae8de5ba6f" targetNamespace="http://schemas.microsoft.com/office/2006/metadata/properties" ma:root="true" ma:fieldsID="97668ca7a1f544c2cd9291a5bcfce177" ns2:_="" ns3:_="">
     <xsd:import namespace="b30be232-03ea-456c-8192-b7ea3ce3ddcd"/>
@@ -36680,17 +36687,6 @@
 </ct:contentTypeSchema>
 </file>
 
-<file path=customXml/item3.xml><?xml version="1.0" encoding="utf-8"?>
-<p:properties xmlns:p="http://schemas.microsoft.com/office/2006/metadata/properties" xmlns:xsi="http://www.w3.org/2001/XMLSchema-instance" xmlns:pc="http://schemas.microsoft.com/office/infopath/2007/PartnerControls">
-  <documentManagement>
-    <TaxCatchAll xmlns="c12dc4f0-a365-46b3-9e07-9aae8de5ba6f" xsi:nil="true"/>
-    <lcf76f155ced4ddcb4097134ff3c332f xmlns="b30be232-03ea-456c-8192-b7ea3ce3ddcd">
-      <Terms xmlns="http://schemas.microsoft.com/office/infopath/2007/PartnerControls"/>
-    </lcf76f155ced4ddcb4097134ff3c332f>
-  </documentManagement>
-</p:properties>
-</file>
-
 <file path=customXml/itemProps1.xml><?xml version="1.0" encoding="utf-8"?>
 <ds:datastoreItem xmlns:ds="http://schemas.openxmlformats.org/officeDocument/2006/customXml" ds:itemID="{62192324-B2BD-44ED-9189-FD50B4E08E52}">
   <ds:schemaRefs>
@@ -36700,6 +36696,23 @@
 </file>
 
 <file path=customXml/itemProps2.xml><?xml version="1.0" encoding="utf-8"?>
+<ds:datastoreItem xmlns:ds="http://schemas.openxmlformats.org/officeDocument/2006/customXml" ds:itemID="{7ADE2A51-02EA-4AA8-8B29-AE3416880B26}">
+  <ds:schemaRefs>
+    <ds:schemaRef ds:uri="b30be232-03ea-456c-8192-b7ea3ce3ddcd"/>
+    <ds:schemaRef ds:uri="http://schemas.microsoft.com/office/2006/documentManagement/types"/>
+    <ds:schemaRef ds:uri="http://purl.org/dc/elements/1.1/"/>
+    <ds:schemaRef ds:uri="http://purl.org/dc/dcmitype/"/>
+    <ds:schemaRef ds:uri="http://purl.org/dc/terms/"/>
+    <ds:schemaRef ds:uri="http://schemas.microsoft.com/office/2006/metadata/properties"/>
+    <ds:schemaRef ds:uri="http://schemas.microsoft.com/office/infopath/2007/PartnerControls"/>
+    <ds:schemaRef ds:uri="http://schemas.openxmlformats.org/package/2006/metadata/core-properties"/>
+    <ds:schemaRef ds:uri="c12dc4f0-a365-46b3-9e07-9aae8de5ba6f"/>
+    <ds:schemaRef ds:uri="http://www.w3.org/XML/1998/namespace"/>
+  </ds:schemaRefs>
+</ds:datastoreItem>
+</file>
+
+<file path=customXml/itemProps3.xml><?xml version="1.0" encoding="utf-8"?>
 <ds:datastoreItem xmlns:ds="http://schemas.openxmlformats.org/officeDocument/2006/customXml" ds:itemID="{B307509C-F6F5-45A5-8F96-BB1A9C2DDFA4}">
   <ds:schemaRefs>
     <ds:schemaRef ds:uri="http://schemas.microsoft.com/office/2006/metadata/contentType"/>
@@ -36718,23 +36731,6 @@
 </ds:datastoreItem>
 </file>
 
-<file path=customXml/itemProps3.xml><?xml version="1.0" encoding="utf-8"?>
-<ds:datastoreItem xmlns:ds="http://schemas.openxmlformats.org/officeDocument/2006/customXml" ds:itemID="{7ADE2A51-02EA-4AA8-8B29-AE3416880B26}">
-  <ds:schemaRefs>
-    <ds:schemaRef ds:uri="b30be232-03ea-456c-8192-b7ea3ce3ddcd"/>
-    <ds:schemaRef ds:uri="http://schemas.microsoft.com/office/2006/documentManagement/types"/>
-    <ds:schemaRef ds:uri="http://purl.org/dc/elements/1.1/"/>
-    <ds:schemaRef ds:uri="http://purl.org/dc/dcmitype/"/>
-    <ds:schemaRef ds:uri="http://purl.org/dc/terms/"/>
-    <ds:schemaRef ds:uri="http://schemas.microsoft.com/office/2006/metadata/properties"/>
-    <ds:schemaRef ds:uri="http://schemas.microsoft.com/office/infopath/2007/PartnerControls"/>
-    <ds:schemaRef ds:uri="http://schemas.openxmlformats.org/package/2006/metadata/core-properties"/>
-    <ds:schemaRef ds:uri="c12dc4f0-a365-46b3-9e07-9aae8de5ba6f"/>
-    <ds:schemaRef ds:uri="http://www.w3.org/XML/1998/namespace"/>
-  </ds:schemaRefs>
-</ds:datastoreItem>
-</file>
-
 <file path=docMetadata/LabelInfo.xml><?xml version="1.0" encoding="utf-8"?>
 <clbl:labelList xmlns:clbl="http://schemas.microsoft.com/office/2020/mipLabelMetadata">
   <clbl:label id="{6a2630e2-1ac5-455e-8217-0156b1936a76}" enabled="1" method="Standard" siteId="{a3927f91-cda1-4696-af89-8c9f1ceffa91}" contentBits="0" removed="0"/>

</xml_diff>